<commit_message>
reunion 23 06 22
</commit_message>
<xml_diff>
--- a/GestionDeProjet/Reunions/Reunion_23_06_2022/Reunion_avancement23_06_22.pptx
+++ b/GestionDeProjet/Reunions/Reunion_23_06_2022/Reunion_avancement23_06_22.pptx
@@ -9,14 +9,15 @@
     <p:sldId id="257" r:id="rId3"/>
     <p:sldId id="259" r:id="rId4"/>
     <p:sldId id="258" r:id="rId5"/>
-    <p:sldId id="268" r:id="rId6"/>
-    <p:sldId id="273" r:id="rId7"/>
-    <p:sldId id="270" r:id="rId8"/>
-    <p:sldId id="271" r:id="rId9"/>
-    <p:sldId id="263" r:id="rId10"/>
-    <p:sldId id="272" r:id="rId11"/>
-    <p:sldId id="274" r:id="rId12"/>
-    <p:sldId id="275" r:id="rId13"/>
+    <p:sldId id="273" r:id="rId6"/>
+    <p:sldId id="277" r:id="rId7"/>
+    <p:sldId id="276" r:id="rId8"/>
+    <p:sldId id="270" r:id="rId9"/>
+    <p:sldId id="271" r:id="rId10"/>
+    <p:sldId id="263" r:id="rId11"/>
+    <p:sldId id="272" r:id="rId12"/>
+    <p:sldId id="274" r:id="rId13"/>
+    <p:sldId id="275" r:id="rId14"/>
   </p:sldIdLst>
   <p:sldSz cx="12192000" cy="6858000"/>
   <p:notesSz cx="6858000" cy="9144000"/>
@@ -561,7 +562,7 @@
             <a:fld id="{A88A01E3-435D-42BE-9973-0B1DC9C31A8C}" type="datetimeFigureOut">
               <a:rPr lang="fr-FR" smtClean="0"/>
               <a:pPr/>
-              <a:t>22/06/2022</a:t>
+              <a:t>23/06/2022</a:t>
             </a:fld>
             <a:endParaRPr lang="fr-FR"/>
           </a:p>
@@ -1486,7 +1487,7 @@
             <a:fld id="{A88A01E3-435D-42BE-9973-0B1DC9C31A8C}" type="datetimeFigureOut">
               <a:rPr lang="fr-FR" smtClean="0"/>
               <a:pPr/>
-              <a:t>22/06/2022</a:t>
+              <a:t>23/06/2022</a:t>
             </a:fld>
             <a:endParaRPr lang="fr-FR"/>
           </a:p>
@@ -2271,7 +2272,7 @@
             <a:fld id="{A88A01E3-435D-42BE-9973-0B1DC9C31A8C}" type="datetimeFigureOut">
               <a:rPr lang="fr-FR" smtClean="0"/>
               <a:pPr/>
-              <a:t>22/06/2022</a:t>
+              <a:t>23/06/2022</a:t>
             </a:fld>
             <a:endParaRPr lang="fr-FR"/>
           </a:p>
@@ -2996,7 +2997,7 @@
             <a:fld id="{A88A01E3-435D-42BE-9973-0B1DC9C31A8C}" type="datetimeFigureOut">
               <a:rPr lang="fr-FR" smtClean="0"/>
               <a:pPr/>
-              <a:t>22/06/2022</a:t>
+              <a:t>23/06/2022</a:t>
             </a:fld>
             <a:endParaRPr lang="fr-FR"/>
           </a:p>
@@ -3745,7 +3746,7 @@
             <a:fld id="{A88A01E3-435D-42BE-9973-0B1DC9C31A8C}" type="datetimeFigureOut">
               <a:rPr lang="fr-FR" smtClean="0"/>
               <a:pPr/>
-              <a:t>22/06/2022</a:t>
+              <a:t>23/06/2022</a:t>
             </a:fld>
             <a:endParaRPr lang="fr-FR"/>
           </a:p>
@@ -4351,7 +4352,7 @@
             <a:fld id="{A88A01E3-435D-42BE-9973-0B1DC9C31A8C}" type="datetimeFigureOut">
               <a:rPr lang="fr-FR" smtClean="0"/>
               <a:pPr/>
-              <a:t>22/06/2022</a:t>
+              <a:t>23/06/2022</a:t>
             </a:fld>
             <a:endParaRPr lang="fr-FR"/>
           </a:p>
@@ -5275,7 +5276,7 @@
             <a:fld id="{A88A01E3-435D-42BE-9973-0B1DC9C31A8C}" type="datetimeFigureOut">
               <a:rPr lang="fr-FR" smtClean="0"/>
               <a:pPr/>
-              <a:t>22/06/2022</a:t>
+              <a:t>23/06/2022</a:t>
             </a:fld>
             <a:endParaRPr lang="fr-FR"/>
           </a:p>
@@ -6393,7 +6394,7 @@
             <a:fld id="{A88A01E3-435D-42BE-9973-0B1DC9C31A8C}" type="datetimeFigureOut">
               <a:rPr lang="fr-FR" smtClean="0"/>
               <a:pPr/>
-              <a:t>22/06/2022</a:t>
+              <a:t>23/06/2022</a:t>
             </a:fld>
             <a:endParaRPr lang="fr-FR"/>
           </a:p>
@@ -7799,6 +7800,1598 @@
 </file>
 
 <file path=ppt/slides/slide10.xml><?xml version="1.0" encoding="utf-8"?>
+<p:sld xmlns:a="http://schemas.openxmlformats.org/drawingml/2006/main" xmlns:r="http://schemas.openxmlformats.org/officeDocument/2006/relationships" xmlns:p="http://schemas.openxmlformats.org/presentationml/2006/main">
+  <p:cSld>
+    <p:spTree>
+      <p:nvGrpSpPr>
+        <p:cNvPr id="1" name=""/>
+        <p:cNvGrpSpPr/>
+        <p:nvPr/>
+      </p:nvGrpSpPr>
+      <p:grpSpPr>
+        <a:xfrm>
+          <a:off x="0" y="0"/>
+          <a:ext cx="0" cy="0"/>
+          <a:chOff x="0" y="0"/>
+          <a:chExt cx="0" cy="0"/>
+        </a:xfrm>
+      </p:grpSpPr>
+      <p:sp>
+        <p:nvSpPr>
+          <p:cNvPr id="2" name="Titre 1">
+            <a:extLst>
+              <a:ext uri="{FF2B5EF4-FFF2-40B4-BE49-F238E27FC236}">
+                <a16:creationId xmlns:a16="http://schemas.microsoft.com/office/drawing/2014/main" id="{EDDD4FAF-1AF8-4391-9A8A-F1F63DD06F1E}"/>
+              </a:ext>
+            </a:extLst>
+          </p:cNvPr>
+          <p:cNvSpPr>
+            <a:spLocks noGrp="1"/>
+          </p:cNvSpPr>
+          <p:nvPr>
+            <p:ph type="title"/>
+          </p:nvPr>
+        </p:nvSpPr>
+        <p:spPr/>
+        <p:txBody>
+          <a:bodyPr/>
+          <a:lstStyle/>
+          <a:p>
+            <a:r>
+              <a:rPr lang="fr-FR" dirty="0"/>
+              <a:t>Soft: Architecture de projet Soft</a:t>
+            </a:r>
+          </a:p>
+        </p:txBody>
+      </p:sp>
+      <p:sp>
+        <p:nvSpPr>
+          <p:cNvPr id="4" name="Rectangle : coins arrondis 3">
+            <a:extLst>
+              <a:ext uri="{FF2B5EF4-FFF2-40B4-BE49-F238E27FC236}">
+                <a16:creationId xmlns:a16="http://schemas.microsoft.com/office/drawing/2014/main" id="{7A135F26-5CA7-7FDE-DADC-A0186D3A1185}"/>
+              </a:ext>
+            </a:extLst>
+          </p:cNvPr>
+          <p:cNvSpPr/>
+          <p:nvPr/>
+        </p:nvSpPr>
+        <p:spPr>
+          <a:xfrm>
+            <a:off x="4437428" y="2988578"/>
+            <a:ext cx="1384184" cy="813732"/>
+          </a:xfrm>
+          <a:prstGeom prst="roundRect">
+            <a:avLst/>
+          </a:prstGeom>
+          <a:noFill/>
+        </p:spPr>
+        <p:style>
+          <a:lnRef idx="2">
+            <a:schemeClr val="accent1">
+              <a:shade val="50000"/>
+            </a:schemeClr>
+          </a:lnRef>
+          <a:fillRef idx="1">
+            <a:schemeClr val="accent1"/>
+          </a:fillRef>
+          <a:effectRef idx="0">
+            <a:schemeClr val="accent1"/>
+          </a:effectRef>
+          <a:fontRef idx="minor">
+            <a:schemeClr val="lt1"/>
+          </a:fontRef>
+        </p:style>
+        <p:txBody>
+          <a:bodyPr rtlCol="0" anchor="ctr"/>
+          <a:lstStyle/>
+          <a:p>
+            <a:pPr algn="ctr"/>
+            <a:r>
+              <a:rPr lang="fr-FR" dirty="0">
+                <a:solidFill>
+                  <a:schemeClr val="tx1"/>
+                </a:solidFill>
+              </a:rPr>
+              <a:t>Gestionnaire de mission</a:t>
+            </a:r>
+          </a:p>
+        </p:txBody>
+      </p:sp>
+      <p:sp>
+        <p:nvSpPr>
+          <p:cNvPr id="5" name="Rectangle : coins arrondis 4">
+            <a:extLst>
+              <a:ext uri="{FF2B5EF4-FFF2-40B4-BE49-F238E27FC236}">
+                <a16:creationId xmlns:a16="http://schemas.microsoft.com/office/drawing/2014/main" id="{23CE6665-AA1B-2215-DA18-AD9439768906}"/>
+              </a:ext>
+            </a:extLst>
+          </p:cNvPr>
+          <p:cNvSpPr/>
+          <p:nvPr/>
+        </p:nvSpPr>
+        <p:spPr>
+          <a:xfrm>
+            <a:off x="6697914" y="3940185"/>
+            <a:ext cx="1384184" cy="813732"/>
+          </a:xfrm>
+          <a:prstGeom prst="roundRect">
+            <a:avLst/>
+          </a:prstGeom>
+          <a:noFill/>
+        </p:spPr>
+        <p:style>
+          <a:lnRef idx="2">
+            <a:schemeClr val="accent1">
+              <a:shade val="50000"/>
+            </a:schemeClr>
+          </a:lnRef>
+          <a:fillRef idx="1">
+            <a:schemeClr val="accent1"/>
+          </a:fillRef>
+          <a:effectRef idx="0">
+            <a:schemeClr val="accent1"/>
+          </a:effectRef>
+          <a:fontRef idx="minor">
+            <a:schemeClr val="lt1"/>
+          </a:fontRef>
+        </p:style>
+        <p:txBody>
+          <a:bodyPr rtlCol="0" anchor="ctr"/>
+          <a:lstStyle/>
+          <a:p>
+            <a:pPr algn="ctr"/>
+            <a:r>
+              <a:rPr lang="fr-FR" dirty="0">
+                <a:solidFill>
+                  <a:schemeClr val="tx1"/>
+                </a:solidFill>
+              </a:rPr>
+              <a:t>Auto</a:t>
+            </a:r>
+          </a:p>
+        </p:txBody>
+      </p:sp>
+      <p:sp>
+        <p:nvSpPr>
+          <p:cNvPr id="6" name="Rectangle : coins arrondis 5">
+            <a:extLst>
+              <a:ext uri="{FF2B5EF4-FFF2-40B4-BE49-F238E27FC236}">
+                <a16:creationId xmlns:a16="http://schemas.microsoft.com/office/drawing/2014/main" id="{804C6B43-D218-7EFA-48A1-7D3E48F576E6}"/>
+              </a:ext>
+            </a:extLst>
+          </p:cNvPr>
+          <p:cNvSpPr/>
+          <p:nvPr/>
+        </p:nvSpPr>
+        <p:spPr>
+          <a:xfrm>
+            <a:off x="6697914" y="2047237"/>
+            <a:ext cx="1384184" cy="813732"/>
+          </a:xfrm>
+          <a:prstGeom prst="roundRect">
+            <a:avLst/>
+          </a:prstGeom>
+          <a:noFill/>
+        </p:spPr>
+        <p:style>
+          <a:lnRef idx="2">
+            <a:schemeClr val="accent1">
+              <a:shade val="50000"/>
+            </a:schemeClr>
+          </a:lnRef>
+          <a:fillRef idx="1">
+            <a:schemeClr val="accent1"/>
+          </a:fillRef>
+          <a:effectRef idx="0">
+            <a:schemeClr val="accent1"/>
+          </a:effectRef>
+          <a:fontRef idx="minor">
+            <a:schemeClr val="lt1"/>
+          </a:fontRef>
+        </p:style>
+        <p:txBody>
+          <a:bodyPr rtlCol="0" anchor="ctr"/>
+          <a:lstStyle/>
+          <a:p>
+            <a:pPr algn="ctr"/>
+            <a:r>
+              <a:rPr lang="fr-FR" dirty="0">
+                <a:solidFill>
+                  <a:schemeClr val="tx1"/>
+                </a:solidFill>
+              </a:rPr>
+              <a:t>Manual</a:t>
+            </a:r>
+          </a:p>
+        </p:txBody>
+      </p:sp>
+      <p:grpSp>
+        <p:nvGrpSpPr>
+          <p:cNvPr id="33" name="Groupe 32">
+            <a:extLst>
+              <a:ext uri="{FF2B5EF4-FFF2-40B4-BE49-F238E27FC236}">
+                <a16:creationId xmlns:a16="http://schemas.microsoft.com/office/drawing/2014/main" id="{2D9B23F7-E0D5-87C4-9005-CC83FE174E7F}"/>
+              </a:ext>
+            </a:extLst>
+          </p:cNvPr>
+          <p:cNvGrpSpPr/>
+          <p:nvPr/>
+        </p:nvGrpSpPr>
+        <p:grpSpPr>
+          <a:xfrm>
+            <a:off x="175469" y="2403628"/>
+            <a:ext cx="3394046" cy="1344351"/>
+            <a:chOff x="175470" y="2950848"/>
+            <a:chExt cx="3394046" cy="1344351"/>
+          </a:xfrm>
+        </p:grpSpPr>
+        <p:sp>
+          <p:nvSpPr>
+            <p:cNvPr id="9" name="Ellipse 8">
+              <a:extLst>
+                <a:ext uri="{FF2B5EF4-FFF2-40B4-BE49-F238E27FC236}">
+                  <a16:creationId xmlns:a16="http://schemas.microsoft.com/office/drawing/2014/main" id="{1F63B939-20E0-B262-1715-3DC5B33C6958}"/>
+                </a:ext>
+              </a:extLst>
+            </p:cNvPr>
+            <p:cNvSpPr/>
+            <p:nvPr/>
+          </p:nvSpPr>
+          <p:spPr>
+            <a:xfrm>
+              <a:off x="183859" y="2950848"/>
+              <a:ext cx="1451994" cy="362279"/>
+            </a:xfrm>
+            <a:prstGeom prst="ellipse">
+              <a:avLst/>
+            </a:prstGeom>
+          </p:spPr>
+          <p:style>
+            <a:lnRef idx="2">
+              <a:schemeClr val="accent1">
+                <a:shade val="50000"/>
+              </a:schemeClr>
+            </a:lnRef>
+            <a:fillRef idx="1">
+              <a:schemeClr val="accent1"/>
+            </a:fillRef>
+            <a:effectRef idx="0">
+              <a:schemeClr val="accent1"/>
+            </a:effectRef>
+            <a:fontRef idx="minor">
+              <a:schemeClr val="lt1"/>
+            </a:fontRef>
+          </p:style>
+          <p:txBody>
+            <a:bodyPr rtlCol="0" anchor="ctr"/>
+            <a:lstStyle/>
+            <a:p>
+              <a:pPr algn="ctr"/>
+              <a:r>
+                <a:rPr lang="fr-FR" dirty="0"/>
+                <a:t>IMU</a:t>
+              </a:r>
+            </a:p>
+          </p:txBody>
+        </p:sp>
+        <p:sp>
+          <p:nvSpPr>
+            <p:cNvPr id="10" name="Ellipse 9">
+              <a:extLst>
+                <a:ext uri="{FF2B5EF4-FFF2-40B4-BE49-F238E27FC236}">
+                  <a16:creationId xmlns:a16="http://schemas.microsoft.com/office/drawing/2014/main" id="{FA76DC8F-024C-6785-3F8B-DEDA52680F40}"/>
+                </a:ext>
+              </a:extLst>
+            </p:cNvPr>
+            <p:cNvSpPr/>
+            <p:nvPr/>
+          </p:nvSpPr>
+          <p:spPr>
+            <a:xfrm>
+              <a:off x="175470" y="3509472"/>
+              <a:ext cx="1451994" cy="362279"/>
+            </a:xfrm>
+            <a:prstGeom prst="ellipse">
+              <a:avLst/>
+            </a:prstGeom>
+          </p:spPr>
+          <p:style>
+            <a:lnRef idx="2">
+              <a:schemeClr val="accent1">
+                <a:shade val="50000"/>
+              </a:schemeClr>
+            </a:lnRef>
+            <a:fillRef idx="1">
+              <a:schemeClr val="accent1"/>
+            </a:fillRef>
+            <a:effectRef idx="0">
+              <a:schemeClr val="accent1"/>
+            </a:effectRef>
+            <a:fontRef idx="minor">
+              <a:schemeClr val="lt1"/>
+            </a:fontRef>
+          </p:style>
+          <p:txBody>
+            <a:bodyPr rtlCol="0" anchor="ctr"/>
+            <a:lstStyle/>
+            <a:p>
+              <a:pPr algn="ctr"/>
+              <a:r>
+                <a:rPr lang="fr-FR" dirty="0"/>
+                <a:t>Odométrie</a:t>
+              </a:r>
+            </a:p>
+          </p:txBody>
+        </p:sp>
+        <p:sp>
+          <p:nvSpPr>
+            <p:cNvPr id="11" name="Ellipse 10">
+              <a:extLst>
+                <a:ext uri="{FF2B5EF4-FFF2-40B4-BE49-F238E27FC236}">
+                  <a16:creationId xmlns:a16="http://schemas.microsoft.com/office/drawing/2014/main" id="{5E80B45F-8F99-98FB-C191-3A7E58F56D08}"/>
+                </a:ext>
+              </a:extLst>
+            </p:cNvPr>
+            <p:cNvSpPr/>
+            <p:nvPr/>
+          </p:nvSpPr>
+          <p:spPr>
+            <a:xfrm>
+              <a:off x="175470" y="3932920"/>
+              <a:ext cx="1451994" cy="362279"/>
+            </a:xfrm>
+            <a:prstGeom prst="ellipse">
+              <a:avLst/>
+            </a:prstGeom>
+          </p:spPr>
+          <p:style>
+            <a:lnRef idx="2">
+              <a:schemeClr val="accent1">
+                <a:shade val="50000"/>
+              </a:schemeClr>
+            </a:lnRef>
+            <a:fillRef idx="1">
+              <a:schemeClr val="accent1"/>
+            </a:fillRef>
+            <a:effectRef idx="0">
+              <a:schemeClr val="accent1"/>
+            </a:effectRef>
+            <a:fontRef idx="minor">
+              <a:schemeClr val="lt1"/>
+            </a:fontRef>
+          </p:style>
+          <p:txBody>
+            <a:bodyPr rtlCol="0" anchor="ctr"/>
+            <a:lstStyle/>
+            <a:p>
+              <a:pPr algn="ctr"/>
+              <a:r>
+                <a:rPr lang="fr-FR" dirty="0"/>
+                <a:t>NFC</a:t>
+              </a:r>
+            </a:p>
+          </p:txBody>
+        </p:sp>
+        <p:sp>
+          <p:nvSpPr>
+            <p:cNvPr id="13" name="Rectangle : coins arrondis 12">
+              <a:extLst>
+                <a:ext uri="{FF2B5EF4-FFF2-40B4-BE49-F238E27FC236}">
+                  <a16:creationId xmlns:a16="http://schemas.microsoft.com/office/drawing/2014/main" id="{0F77763D-B987-CF34-26B7-2FB0A4BF2784}"/>
+                </a:ext>
+              </a:extLst>
+            </p:cNvPr>
+            <p:cNvSpPr/>
+            <p:nvPr/>
+          </p:nvSpPr>
+          <p:spPr>
+            <a:xfrm>
+              <a:off x="2185332" y="3022134"/>
+              <a:ext cx="1384184" cy="813732"/>
+            </a:xfrm>
+            <a:prstGeom prst="roundRect">
+              <a:avLst/>
+            </a:prstGeom>
+            <a:noFill/>
+          </p:spPr>
+          <p:style>
+            <a:lnRef idx="2">
+              <a:schemeClr val="accent1">
+                <a:shade val="50000"/>
+              </a:schemeClr>
+            </a:lnRef>
+            <a:fillRef idx="1">
+              <a:schemeClr val="accent1"/>
+            </a:fillRef>
+            <a:effectRef idx="0">
+              <a:schemeClr val="accent1"/>
+            </a:effectRef>
+            <a:fontRef idx="minor">
+              <a:schemeClr val="lt1"/>
+            </a:fontRef>
+          </p:style>
+          <p:txBody>
+            <a:bodyPr rtlCol="0" anchor="ctr"/>
+            <a:lstStyle/>
+            <a:p>
+              <a:pPr algn="ctr"/>
+              <a:r>
+                <a:rPr lang="fr-FR" dirty="0">
+                  <a:solidFill>
+                    <a:schemeClr val="tx1"/>
+                  </a:solidFill>
+                </a:rPr>
+                <a:t>Localisation</a:t>
+              </a:r>
+            </a:p>
+          </p:txBody>
+        </p:sp>
+        <p:cxnSp>
+          <p:nvCxnSpPr>
+            <p:cNvPr id="17" name="Connecteur : en angle 16">
+              <a:extLst>
+                <a:ext uri="{FF2B5EF4-FFF2-40B4-BE49-F238E27FC236}">
+                  <a16:creationId xmlns:a16="http://schemas.microsoft.com/office/drawing/2014/main" id="{0314C3F8-12F9-3110-1619-7067ECA21E23}"/>
+                </a:ext>
+              </a:extLst>
+            </p:cNvPr>
+            <p:cNvCxnSpPr>
+              <a:cxnSpLocks/>
+              <a:stCxn id="9" idx="6"/>
+            </p:cNvCxnSpPr>
+            <p:nvPr/>
+          </p:nvCxnSpPr>
+          <p:spPr>
+            <a:xfrm>
+              <a:off x="1635853" y="3131988"/>
+              <a:ext cx="541090" cy="154225"/>
+            </a:xfrm>
+            <a:prstGeom prst="bentConnector3">
+              <a:avLst>
+                <a:gd name="adj1" fmla="val 29845"/>
+              </a:avLst>
+            </a:prstGeom>
+            <a:ln>
+              <a:tailEnd type="triangle"/>
+            </a:ln>
+          </p:spPr>
+          <p:style>
+            <a:lnRef idx="1">
+              <a:schemeClr val="accent1"/>
+            </a:lnRef>
+            <a:fillRef idx="0">
+              <a:schemeClr val="accent1"/>
+            </a:fillRef>
+            <a:effectRef idx="0">
+              <a:schemeClr val="accent1"/>
+            </a:effectRef>
+            <a:fontRef idx="minor">
+              <a:schemeClr val="tx1"/>
+            </a:fontRef>
+          </p:style>
+        </p:cxnSp>
+        <p:cxnSp>
+          <p:nvCxnSpPr>
+            <p:cNvPr id="20" name="Connecteur : en angle 19">
+              <a:extLst>
+                <a:ext uri="{FF2B5EF4-FFF2-40B4-BE49-F238E27FC236}">
+                  <a16:creationId xmlns:a16="http://schemas.microsoft.com/office/drawing/2014/main" id="{F2CF4EE4-69EC-C7D6-978B-F9A5EF34C9BA}"/>
+                </a:ext>
+              </a:extLst>
+            </p:cNvPr>
+            <p:cNvCxnSpPr>
+              <a:cxnSpLocks/>
+              <a:stCxn id="10" idx="6"/>
+            </p:cNvCxnSpPr>
+            <p:nvPr/>
+          </p:nvCxnSpPr>
+          <p:spPr>
+            <a:xfrm flipV="1">
+              <a:off x="1627464" y="3571787"/>
+              <a:ext cx="549479" cy="118825"/>
+            </a:xfrm>
+            <a:prstGeom prst="bentConnector3">
+              <a:avLst>
+                <a:gd name="adj1" fmla="val 30153"/>
+              </a:avLst>
+            </a:prstGeom>
+            <a:ln>
+              <a:tailEnd type="triangle"/>
+            </a:ln>
+          </p:spPr>
+          <p:style>
+            <a:lnRef idx="1">
+              <a:schemeClr val="accent1"/>
+            </a:lnRef>
+            <a:fillRef idx="0">
+              <a:schemeClr val="accent1"/>
+            </a:fillRef>
+            <a:effectRef idx="0">
+              <a:schemeClr val="accent1"/>
+            </a:effectRef>
+            <a:fontRef idx="minor">
+              <a:schemeClr val="tx1"/>
+            </a:fontRef>
+          </p:style>
+        </p:cxnSp>
+        <p:cxnSp>
+          <p:nvCxnSpPr>
+            <p:cNvPr id="22" name="Connecteur : en angle 21">
+              <a:extLst>
+                <a:ext uri="{FF2B5EF4-FFF2-40B4-BE49-F238E27FC236}">
+                  <a16:creationId xmlns:a16="http://schemas.microsoft.com/office/drawing/2014/main" id="{920D6936-2B92-405A-4E7E-F07E0A36F2EF}"/>
+                </a:ext>
+              </a:extLst>
+            </p:cNvPr>
+            <p:cNvCxnSpPr>
+              <a:cxnSpLocks/>
+              <a:stCxn id="11" idx="6"/>
+            </p:cNvCxnSpPr>
+            <p:nvPr/>
+          </p:nvCxnSpPr>
+          <p:spPr>
+            <a:xfrm flipV="1">
+              <a:off x="1627464" y="3710361"/>
+              <a:ext cx="549479" cy="403699"/>
+            </a:xfrm>
+            <a:prstGeom prst="bentConnector3">
+              <a:avLst/>
+            </a:prstGeom>
+            <a:ln>
+              <a:tailEnd type="triangle"/>
+            </a:ln>
+          </p:spPr>
+          <p:style>
+            <a:lnRef idx="1">
+              <a:schemeClr val="accent1"/>
+            </a:lnRef>
+            <a:fillRef idx="0">
+              <a:schemeClr val="accent1"/>
+            </a:fillRef>
+            <a:effectRef idx="0">
+              <a:schemeClr val="accent1"/>
+            </a:effectRef>
+            <a:fontRef idx="minor">
+              <a:schemeClr val="tx1"/>
+            </a:fontRef>
+          </p:style>
+        </p:cxnSp>
+      </p:grpSp>
+      <p:sp>
+        <p:nvSpPr>
+          <p:cNvPr id="34" name="Ellipse 33">
+            <a:extLst>
+              <a:ext uri="{FF2B5EF4-FFF2-40B4-BE49-F238E27FC236}">
+                <a16:creationId xmlns:a16="http://schemas.microsoft.com/office/drawing/2014/main" id="{63F95585-822D-5F84-4FB7-347D15902B1D}"/>
+              </a:ext>
+            </a:extLst>
+          </p:cNvPr>
+          <p:cNvSpPr/>
+          <p:nvPr/>
+        </p:nvSpPr>
+        <p:spPr>
+          <a:xfrm>
+            <a:off x="183858" y="4061593"/>
+            <a:ext cx="1451994" cy="362279"/>
+          </a:xfrm>
+          <a:prstGeom prst="ellipse">
+            <a:avLst/>
+          </a:prstGeom>
+        </p:spPr>
+        <p:style>
+          <a:lnRef idx="2">
+            <a:schemeClr val="accent1">
+              <a:shade val="50000"/>
+            </a:schemeClr>
+          </a:lnRef>
+          <a:fillRef idx="1">
+            <a:schemeClr val="accent1"/>
+          </a:fillRef>
+          <a:effectRef idx="0">
+            <a:schemeClr val="accent1"/>
+          </a:effectRef>
+          <a:fontRef idx="minor">
+            <a:schemeClr val="lt1"/>
+          </a:fontRef>
+        </p:style>
+        <p:txBody>
+          <a:bodyPr rtlCol="0" anchor="ctr"/>
+          <a:lstStyle/>
+          <a:p>
+            <a:pPr algn="ctr"/>
+            <a:r>
+              <a:rPr lang="fr-FR" dirty="0"/>
+              <a:t>Balises</a:t>
+            </a:r>
+          </a:p>
+        </p:txBody>
+      </p:sp>
+      <p:sp>
+        <p:nvSpPr>
+          <p:cNvPr id="35" name="Ellipse 34">
+            <a:extLst>
+              <a:ext uri="{FF2B5EF4-FFF2-40B4-BE49-F238E27FC236}">
+                <a16:creationId xmlns:a16="http://schemas.microsoft.com/office/drawing/2014/main" id="{332CE12A-F7E9-196C-03CC-CCDAC39D2501}"/>
+              </a:ext>
+            </a:extLst>
+          </p:cNvPr>
+          <p:cNvSpPr/>
+          <p:nvPr/>
+        </p:nvSpPr>
+        <p:spPr>
+          <a:xfrm>
+            <a:off x="4403872" y="5981391"/>
+            <a:ext cx="1451994" cy="362279"/>
+          </a:xfrm>
+          <a:prstGeom prst="ellipse">
+            <a:avLst/>
+          </a:prstGeom>
+        </p:spPr>
+        <p:style>
+          <a:lnRef idx="2">
+            <a:schemeClr val="accent1">
+              <a:shade val="50000"/>
+            </a:schemeClr>
+          </a:lnRef>
+          <a:fillRef idx="1">
+            <a:schemeClr val="accent1"/>
+          </a:fillRef>
+          <a:effectRef idx="0">
+            <a:schemeClr val="accent1"/>
+          </a:effectRef>
+          <a:fontRef idx="minor">
+            <a:schemeClr val="lt1"/>
+          </a:fontRef>
+        </p:style>
+        <p:txBody>
+          <a:bodyPr rtlCol="0" anchor="ctr"/>
+          <a:lstStyle/>
+          <a:p>
+            <a:pPr algn="ctr"/>
+            <a:r>
+              <a:rPr lang="fr-FR" dirty="0"/>
+              <a:t>IHM</a:t>
+            </a:r>
+          </a:p>
+        </p:txBody>
+      </p:sp>
+      <p:sp>
+        <p:nvSpPr>
+          <p:cNvPr id="36" name="Rectangle : coins arrondis 35">
+            <a:extLst>
+              <a:ext uri="{FF2B5EF4-FFF2-40B4-BE49-F238E27FC236}">
+                <a16:creationId xmlns:a16="http://schemas.microsoft.com/office/drawing/2014/main" id="{EE35229E-419E-FB7A-8350-AE38DC9644B2}"/>
+              </a:ext>
+            </a:extLst>
+          </p:cNvPr>
+          <p:cNvSpPr/>
+          <p:nvPr/>
+        </p:nvSpPr>
+        <p:spPr>
+          <a:xfrm>
+            <a:off x="4437428" y="4753917"/>
+            <a:ext cx="1384184" cy="813732"/>
+          </a:xfrm>
+          <a:prstGeom prst="roundRect">
+            <a:avLst/>
+          </a:prstGeom>
+          <a:noFill/>
+        </p:spPr>
+        <p:style>
+          <a:lnRef idx="2">
+            <a:schemeClr val="accent1">
+              <a:shade val="50000"/>
+            </a:schemeClr>
+          </a:lnRef>
+          <a:fillRef idx="1">
+            <a:schemeClr val="accent1"/>
+          </a:fillRef>
+          <a:effectRef idx="0">
+            <a:schemeClr val="accent1"/>
+          </a:effectRef>
+          <a:fontRef idx="minor">
+            <a:schemeClr val="lt1"/>
+          </a:fontRef>
+        </p:style>
+        <p:txBody>
+          <a:bodyPr rtlCol="0" anchor="ctr"/>
+          <a:lstStyle/>
+          <a:p>
+            <a:pPr algn="ctr"/>
+            <a:r>
+              <a:rPr lang="fr-FR" dirty="0">
+                <a:solidFill>
+                  <a:schemeClr val="tx1"/>
+                </a:solidFill>
+              </a:rPr>
+              <a:t>Gestionnaire IHM</a:t>
+            </a:r>
+          </a:p>
+        </p:txBody>
+      </p:sp>
+      <p:sp>
+        <p:nvSpPr>
+          <p:cNvPr id="37" name="Rectangle : coins arrondis 36">
+            <a:extLst>
+              <a:ext uri="{FF2B5EF4-FFF2-40B4-BE49-F238E27FC236}">
+                <a16:creationId xmlns:a16="http://schemas.microsoft.com/office/drawing/2014/main" id="{7B754B41-568F-C0AF-00AE-A6A2DC47A026}"/>
+              </a:ext>
+            </a:extLst>
+          </p:cNvPr>
+          <p:cNvSpPr/>
+          <p:nvPr/>
+        </p:nvSpPr>
+        <p:spPr>
+          <a:xfrm>
+            <a:off x="2176942" y="3835866"/>
+            <a:ext cx="1384184" cy="813732"/>
+          </a:xfrm>
+          <a:prstGeom prst="roundRect">
+            <a:avLst/>
+          </a:prstGeom>
+          <a:noFill/>
+        </p:spPr>
+        <p:style>
+          <a:lnRef idx="2">
+            <a:schemeClr val="accent1">
+              <a:shade val="50000"/>
+            </a:schemeClr>
+          </a:lnRef>
+          <a:fillRef idx="1">
+            <a:schemeClr val="accent1"/>
+          </a:fillRef>
+          <a:effectRef idx="0">
+            <a:schemeClr val="accent1"/>
+          </a:effectRef>
+          <a:fontRef idx="minor">
+            <a:schemeClr val="lt1"/>
+          </a:fontRef>
+        </p:style>
+        <p:txBody>
+          <a:bodyPr rtlCol="0" anchor="ctr"/>
+          <a:lstStyle/>
+          <a:p>
+            <a:pPr algn="ctr"/>
+            <a:r>
+              <a:rPr lang="fr-FR" dirty="0">
+                <a:solidFill>
+                  <a:schemeClr val="tx1"/>
+                </a:solidFill>
+              </a:rPr>
+              <a:t>Détection balises</a:t>
+            </a:r>
+          </a:p>
+        </p:txBody>
+      </p:sp>
+      <p:sp>
+        <p:nvSpPr>
+          <p:cNvPr id="38" name="Rectangle : coins arrondis 37">
+            <a:extLst>
+              <a:ext uri="{FF2B5EF4-FFF2-40B4-BE49-F238E27FC236}">
+                <a16:creationId xmlns:a16="http://schemas.microsoft.com/office/drawing/2014/main" id="{EFF2B3C2-D712-3443-0847-EDFDE9B31840}"/>
+              </a:ext>
+            </a:extLst>
+          </p:cNvPr>
+          <p:cNvSpPr/>
+          <p:nvPr/>
+        </p:nvSpPr>
+        <p:spPr>
+          <a:xfrm>
+            <a:off x="8082098" y="5013976"/>
+            <a:ext cx="1384184" cy="813732"/>
+          </a:xfrm>
+          <a:prstGeom prst="roundRect">
+            <a:avLst/>
+          </a:prstGeom>
+          <a:noFill/>
+        </p:spPr>
+        <p:style>
+          <a:lnRef idx="2">
+            <a:schemeClr val="accent1">
+              <a:shade val="50000"/>
+            </a:schemeClr>
+          </a:lnRef>
+          <a:fillRef idx="1">
+            <a:schemeClr val="accent1"/>
+          </a:fillRef>
+          <a:effectRef idx="0">
+            <a:schemeClr val="accent1"/>
+          </a:effectRef>
+          <a:fontRef idx="minor">
+            <a:schemeClr val="lt1"/>
+          </a:fontRef>
+        </p:style>
+        <p:txBody>
+          <a:bodyPr rtlCol="0" anchor="ctr"/>
+          <a:lstStyle/>
+          <a:p>
+            <a:pPr algn="ctr"/>
+            <a:r>
+              <a:rPr lang="fr-FR" dirty="0">
+                <a:solidFill>
+                  <a:schemeClr val="tx1"/>
+                </a:solidFill>
+              </a:rPr>
+              <a:t>Gestionnaires d’alertes</a:t>
+            </a:r>
+          </a:p>
+        </p:txBody>
+      </p:sp>
+      <p:sp>
+        <p:nvSpPr>
+          <p:cNvPr id="39" name="Rectangle : coins arrondis 38">
+            <a:extLst>
+              <a:ext uri="{FF2B5EF4-FFF2-40B4-BE49-F238E27FC236}">
+                <a16:creationId xmlns:a16="http://schemas.microsoft.com/office/drawing/2014/main" id="{5E0FE08D-6110-7D34-11B3-D57BEC730617}"/>
+              </a:ext>
+            </a:extLst>
+          </p:cNvPr>
+          <p:cNvSpPr/>
+          <p:nvPr/>
+        </p:nvSpPr>
+        <p:spPr>
+          <a:xfrm>
+            <a:off x="9661323" y="5019724"/>
+            <a:ext cx="1384184" cy="813732"/>
+          </a:xfrm>
+          <a:prstGeom prst="roundRect">
+            <a:avLst/>
+          </a:prstGeom>
+          <a:noFill/>
+        </p:spPr>
+        <p:style>
+          <a:lnRef idx="2">
+            <a:schemeClr val="accent1">
+              <a:shade val="50000"/>
+            </a:schemeClr>
+          </a:lnRef>
+          <a:fillRef idx="1">
+            <a:schemeClr val="accent1"/>
+          </a:fillRef>
+          <a:effectRef idx="0">
+            <a:schemeClr val="accent1"/>
+          </a:effectRef>
+          <a:fontRef idx="minor">
+            <a:schemeClr val="lt1"/>
+          </a:fontRef>
+        </p:style>
+        <p:txBody>
+          <a:bodyPr rtlCol="0" anchor="ctr"/>
+          <a:lstStyle/>
+          <a:p>
+            <a:pPr algn="ctr"/>
+            <a:r>
+              <a:rPr lang="fr-FR" dirty="0">
+                <a:solidFill>
+                  <a:schemeClr val="tx1"/>
+                </a:solidFill>
+              </a:rPr>
+              <a:t>Navigation</a:t>
+            </a:r>
+          </a:p>
+        </p:txBody>
+      </p:sp>
+      <p:sp>
+        <p:nvSpPr>
+          <p:cNvPr id="40" name="Rectangle : coins arrondis 39">
+            <a:extLst>
+              <a:ext uri="{FF2B5EF4-FFF2-40B4-BE49-F238E27FC236}">
+                <a16:creationId xmlns:a16="http://schemas.microsoft.com/office/drawing/2014/main" id="{4CC7CF85-73D9-5C3D-5C13-72C728D6DD7A}"/>
+              </a:ext>
+            </a:extLst>
+          </p:cNvPr>
+          <p:cNvSpPr/>
+          <p:nvPr/>
+        </p:nvSpPr>
+        <p:spPr>
+          <a:xfrm>
+            <a:off x="9660625" y="2986209"/>
+            <a:ext cx="1384184" cy="813732"/>
+          </a:xfrm>
+          <a:prstGeom prst="roundRect">
+            <a:avLst/>
+          </a:prstGeom>
+          <a:noFill/>
+        </p:spPr>
+        <p:style>
+          <a:lnRef idx="2">
+            <a:schemeClr val="accent1">
+              <a:shade val="50000"/>
+            </a:schemeClr>
+          </a:lnRef>
+          <a:fillRef idx="1">
+            <a:schemeClr val="accent1"/>
+          </a:fillRef>
+          <a:effectRef idx="0">
+            <a:schemeClr val="accent1"/>
+          </a:effectRef>
+          <a:fontRef idx="minor">
+            <a:schemeClr val="lt1"/>
+          </a:fontRef>
+        </p:style>
+        <p:txBody>
+          <a:bodyPr rtlCol="0" anchor="ctr"/>
+          <a:lstStyle/>
+          <a:p>
+            <a:pPr algn="ctr"/>
+            <a:r>
+              <a:rPr lang="fr-FR" dirty="0">
+                <a:solidFill>
+                  <a:schemeClr val="tx1"/>
+                </a:solidFill>
+              </a:rPr>
+              <a:t>Evitement d’obstacles</a:t>
+            </a:r>
+          </a:p>
+        </p:txBody>
+      </p:sp>
+      <p:sp>
+        <p:nvSpPr>
+          <p:cNvPr id="41" name="Ellipse 40">
+            <a:extLst>
+              <a:ext uri="{FF2B5EF4-FFF2-40B4-BE49-F238E27FC236}">
+                <a16:creationId xmlns:a16="http://schemas.microsoft.com/office/drawing/2014/main" id="{F5E62DA9-4817-1857-CB4C-702544E72A15}"/>
+              </a:ext>
+            </a:extLst>
+          </p:cNvPr>
+          <p:cNvSpPr/>
+          <p:nvPr/>
+        </p:nvSpPr>
+        <p:spPr>
+          <a:xfrm>
+            <a:off x="9635458" y="6087469"/>
+            <a:ext cx="1451994" cy="362279"/>
+          </a:xfrm>
+          <a:prstGeom prst="ellipse">
+            <a:avLst/>
+          </a:prstGeom>
+        </p:spPr>
+        <p:style>
+          <a:lnRef idx="2">
+            <a:schemeClr val="accent1">
+              <a:shade val="50000"/>
+            </a:schemeClr>
+          </a:lnRef>
+          <a:fillRef idx="1">
+            <a:schemeClr val="accent1"/>
+          </a:fillRef>
+          <a:effectRef idx="0">
+            <a:schemeClr val="accent1"/>
+          </a:effectRef>
+          <a:fontRef idx="minor">
+            <a:schemeClr val="lt1"/>
+          </a:fontRef>
+        </p:style>
+        <p:txBody>
+          <a:bodyPr rtlCol="0" anchor="ctr"/>
+          <a:lstStyle/>
+          <a:p>
+            <a:pPr algn="ctr"/>
+            <a:r>
+              <a:rPr lang="fr-FR" dirty="0"/>
+              <a:t>Dijkstra</a:t>
+            </a:r>
+          </a:p>
+        </p:txBody>
+      </p:sp>
+      <p:cxnSp>
+        <p:nvCxnSpPr>
+          <p:cNvPr id="43" name="Connecteur : en angle 42">
+            <a:extLst>
+              <a:ext uri="{FF2B5EF4-FFF2-40B4-BE49-F238E27FC236}">
+                <a16:creationId xmlns:a16="http://schemas.microsoft.com/office/drawing/2014/main" id="{649832DF-EC81-BF95-2CAE-F7BD7955A8A5}"/>
+              </a:ext>
+            </a:extLst>
+          </p:cNvPr>
+          <p:cNvCxnSpPr>
+            <a:cxnSpLocks/>
+            <a:stCxn id="13" idx="3"/>
+          </p:cNvCxnSpPr>
+          <p:nvPr/>
+        </p:nvCxnSpPr>
+        <p:spPr>
+          <a:xfrm>
+            <a:off x="3569515" y="2881780"/>
+            <a:ext cx="867913" cy="414048"/>
+          </a:xfrm>
+          <a:prstGeom prst="bentConnector3">
+            <a:avLst/>
+          </a:prstGeom>
+          <a:ln>
+            <a:tailEnd type="triangle"/>
+          </a:ln>
+        </p:spPr>
+        <p:style>
+          <a:lnRef idx="1">
+            <a:schemeClr val="accent1"/>
+          </a:lnRef>
+          <a:fillRef idx="0">
+            <a:schemeClr val="accent1"/>
+          </a:fillRef>
+          <a:effectRef idx="0">
+            <a:schemeClr val="accent1"/>
+          </a:effectRef>
+          <a:fontRef idx="minor">
+            <a:schemeClr val="tx1"/>
+          </a:fontRef>
+        </p:style>
+      </p:cxnSp>
+      <p:cxnSp>
+        <p:nvCxnSpPr>
+          <p:cNvPr id="45" name="Connecteur : en angle 44">
+            <a:extLst>
+              <a:ext uri="{FF2B5EF4-FFF2-40B4-BE49-F238E27FC236}">
+                <a16:creationId xmlns:a16="http://schemas.microsoft.com/office/drawing/2014/main" id="{099266D4-97F5-4E7B-ADE9-790139E8A7D6}"/>
+              </a:ext>
+            </a:extLst>
+          </p:cNvPr>
+          <p:cNvCxnSpPr>
+            <a:cxnSpLocks/>
+            <a:stCxn id="37" idx="3"/>
+          </p:cNvCxnSpPr>
+          <p:nvPr/>
+        </p:nvCxnSpPr>
+        <p:spPr>
+          <a:xfrm flipV="1">
+            <a:off x="3561126" y="3571624"/>
+            <a:ext cx="876302" cy="671108"/>
+          </a:xfrm>
+          <a:prstGeom prst="bentConnector3">
+            <a:avLst/>
+          </a:prstGeom>
+          <a:ln>
+            <a:tailEnd type="triangle"/>
+          </a:ln>
+        </p:spPr>
+        <p:style>
+          <a:lnRef idx="1">
+            <a:schemeClr val="accent1"/>
+          </a:lnRef>
+          <a:fillRef idx="0">
+            <a:schemeClr val="accent1"/>
+          </a:fillRef>
+          <a:effectRef idx="0">
+            <a:schemeClr val="accent1"/>
+          </a:effectRef>
+          <a:fontRef idx="minor">
+            <a:schemeClr val="tx1"/>
+          </a:fontRef>
+        </p:style>
+      </p:cxnSp>
+      <p:cxnSp>
+        <p:nvCxnSpPr>
+          <p:cNvPr id="47" name="Connecteur droit avec flèche 46">
+            <a:extLst>
+              <a:ext uri="{FF2B5EF4-FFF2-40B4-BE49-F238E27FC236}">
+                <a16:creationId xmlns:a16="http://schemas.microsoft.com/office/drawing/2014/main" id="{9D7B20DF-908E-7C86-8190-D45D11FABD13}"/>
+              </a:ext>
+            </a:extLst>
+          </p:cNvPr>
+          <p:cNvCxnSpPr>
+            <a:cxnSpLocks/>
+            <a:stCxn id="34" idx="6"/>
+            <a:endCxn id="37" idx="1"/>
+          </p:cNvCxnSpPr>
+          <p:nvPr/>
+        </p:nvCxnSpPr>
+        <p:spPr>
+          <a:xfrm flipV="1">
+            <a:off x="1635852" y="4242732"/>
+            <a:ext cx="541090" cy="1"/>
+          </a:xfrm>
+          <a:prstGeom prst="straightConnector1">
+            <a:avLst/>
+          </a:prstGeom>
+          <a:ln>
+            <a:tailEnd type="triangle"/>
+          </a:ln>
+        </p:spPr>
+        <p:style>
+          <a:lnRef idx="1">
+            <a:schemeClr val="accent1"/>
+          </a:lnRef>
+          <a:fillRef idx="0">
+            <a:schemeClr val="accent1"/>
+          </a:fillRef>
+          <a:effectRef idx="0">
+            <a:schemeClr val="accent1"/>
+          </a:effectRef>
+          <a:fontRef idx="minor">
+            <a:schemeClr val="tx1"/>
+          </a:fontRef>
+        </p:style>
+      </p:cxnSp>
+      <p:cxnSp>
+        <p:nvCxnSpPr>
+          <p:cNvPr id="56" name="Connecteur droit avec flèche 55">
+            <a:extLst>
+              <a:ext uri="{FF2B5EF4-FFF2-40B4-BE49-F238E27FC236}">
+                <a16:creationId xmlns:a16="http://schemas.microsoft.com/office/drawing/2014/main" id="{FC53D68D-0788-EF8A-CDDE-B3346EF5CE34}"/>
+              </a:ext>
+            </a:extLst>
+          </p:cNvPr>
+          <p:cNvCxnSpPr>
+            <a:stCxn id="4" idx="2"/>
+            <a:endCxn id="36" idx="0"/>
+          </p:cNvCxnSpPr>
+          <p:nvPr/>
+        </p:nvCxnSpPr>
+        <p:spPr>
+          <a:xfrm>
+            <a:off x="5129520" y="3802310"/>
+            <a:ext cx="0" cy="951607"/>
+          </a:xfrm>
+          <a:prstGeom prst="straightConnector1">
+            <a:avLst/>
+          </a:prstGeom>
+          <a:ln>
+            <a:headEnd type="triangle"/>
+            <a:tailEnd type="triangle"/>
+          </a:ln>
+        </p:spPr>
+        <p:style>
+          <a:lnRef idx="1">
+            <a:schemeClr val="accent1"/>
+          </a:lnRef>
+          <a:fillRef idx="0">
+            <a:schemeClr val="accent1"/>
+          </a:fillRef>
+          <a:effectRef idx="0">
+            <a:schemeClr val="accent1"/>
+          </a:effectRef>
+          <a:fontRef idx="minor">
+            <a:schemeClr val="tx1"/>
+          </a:fontRef>
+        </p:style>
+      </p:cxnSp>
+      <p:cxnSp>
+        <p:nvCxnSpPr>
+          <p:cNvPr id="58" name="Connecteur droit avec flèche 57">
+            <a:extLst>
+              <a:ext uri="{FF2B5EF4-FFF2-40B4-BE49-F238E27FC236}">
+                <a16:creationId xmlns:a16="http://schemas.microsoft.com/office/drawing/2014/main" id="{24B976DA-B15A-61A7-1686-7DAB19BF621D}"/>
+              </a:ext>
+            </a:extLst>
+          </p:cNvPr>
+          <p:cNvCxnSpPr>
+            <a:stCxn id="39" idx="2"/>
+            <a:endCxn id="41" idx="0"/>
+          </p:cNvCxnSpPr>
+          <p:nvPr/>
+        </p:nvCxnSpPr>
+        <p:spPr>
+          <a:xfrm>
+            <a:off x="10353415" y="5833456"/>
+            <a:ext cx="8040" cy="254013"/>
+          </a:xfrm>
+          <a:prstGeom prst="straightConnector1">
+            <a:avLst/>
+          </a:prstGeom>
+          <a:ln>
+            <a:headEnd type="triangle"/>
+            <a:tailEnd type="triangle"/>
+          </a:ln>
+        </p:spPr>
+        <p:style>
+          <a:lnRef idx="1">
+            <a:schemeClr val="accent1"/>
+          </a:lnRef>
+          <a:fillRef idx="0">
+            <a:schemeClr val="accent1"/>
+          </a:fillRef>
+          <a:effectRef idx="0">
+            <a:schemeClr val="accent1"/>
+          </a:effectRef>
+          <a:fontRef idx="minor">
+            <a:schemeClr val="tx1"/>
+          </a:fontRef>
+        </p:style>
+      </p:cxnSp>
+      <p:cxnSp>
+        <p:nvCxnSpPr>
+          <p:cNvPr id="64" name="Connecteur : en angle 63">
+            <a:extLst>
+              <a:ext uri="{FF2B5EF4-FFF2-40B4-BE49-F238E27FC236}">
+                <a16:creationId xmlns:a16="http://schemas.microsoft.com/office/drawing/2014/main" id="{A6F0342A-D2FE-E4F9-C7BD-DB7EF262D74A}"/>
+              </a:ext>
+            </a:extLst>
+          </p:cNvPr>
+          <p:cNvCxnSpPr>
+            <a:cxnSpLocks/>
+            <a:endCxn id="6" idx="1"/>
+          </p:cNvCxnSpPr>
+          <p:nvPr/>
+        </p:nvCxnSpPr>
+        <p:spPr>
+          <a:xfrm flipV="1">
+            <a:off x="5821612" y="2454103"/>
+            <a:ext cx="876302" cy="793498"/>
+          </a:xfrm>
+          <a:prstGeom prst="bentConnector3">
+            <a:avLst>
+              <a:gd name="adj1" fmla="val 50000"/>
+            </a:avLst>
+          </a:prstGeom>
+          <a:ln>
+            <a:tailEnd type="triangle"/>
+          </a:ln>
+        </p:spPr>
+        <p:style>
+          <a:lnRef idx="1">
+            <a:schemeClr val="accent1"/>
+          </a:lnRef>
+          <a:fillRef idx="0">
+            <a:schemeClr val="accent1"/>
+          </a:fillRef>
+          <a:effectRef idx="0">
+            <a:schemeClr val="accent1"/>
+          </a:effectRef>
+          <a:fontRef idx="minor">
+            <a:schemeClr val="tx1"/>
+          </a:fontRef>
+        </p:style>
+      </p:cxnSp>
+      <p:cxnSp>
+        <p:nvCxnSpPr>
+          <p:cNvPr id="73" name="Connecteur : en angle 72">
+            <a:extLst>
+              <a:ext uri="{FF2B5EF4-FFF2-40B4-BE49-F238E27FC236}">
+                <a16:creationId xmlns:a16="http://schemas.microsoft.com/office/drawing/2014/main" id="{5F4AF7E8-F5BC-3D9D-7373-AF8E4715ADCD}"/>
+              </a:ext>
+            </a:extLst>
+          </p:cNvPr>
+          <p:cNvCxnSpPr>
+            <a:endCxn id="5" idx="1"/>
+          </p:cNvCxnSpPr>
+          <p:nvPr/>
+        </p:nvCxnSpPr>
+        <p:spPr>
+          <a:xfrm>
+            <a:off x="5821612" y="3571624"/>
+            <a:ext cx="876302" cy="775427"/>
+          </a:xfrm>
+          <a:prstGeom prst="bentConnector3">
+            <a:avLst/>
+          </a:prstGeom>
+          <a:ln>
+            <a:tailEnd type="triangle"/>
+          </a:ln>
+        </p:spPr>
+        <p:style>
+          <a:lnRef idx="1">
+            <a:schemeClr val="accent1"/>
+          </a:lnRef>
+          <a:fillRef idx="0">
+            <a:schemeClr val="accent1"/>
+          </a:fillRef>
+          <a:effectRef idx="0">
+            <a:schemeClr val="accent1"/>
+          </a:effectRef>
+          <a:fontRef idx="minor">
+            <a:schemeClr val="tx1"/>
+          </a:fontRef>
+        </p:style>
+      </p:cxnSp>
+      <p:cxnSp>
+        <p:nvCxnSpPr>
+          <p:cNvPr id="75" name="Connecteur : en angle 74">
+            <a:extLst>
+              <a:ext uri="{FF2B5EF4-FFF2-40B4-BE49-F238E27FC236}">
+                <a16:creationId xmlns:a16="http://schemas.microsoft.com/office/drawing/2014/main" id="{841990B5-CDAF-C60C-A02C-D28C8D27D427}"/>
+              </a:ext>
+            </a:extLst>
+          </p:cNvPr>
+          <p:cNvCxnSpPr>
+            <a:stCxn id="5" idx="2"/>
+            <a:endCxn id="38" idx="1"/>
+          </p:cNvCxnSpPr>
+          <p:nvPr/>
+        </p:nvCxnSpPr>
+        <p:spPr>
+          <a:xfrm rot="16200000" flipH="1">
+            <a:off x="7402590" y="4741333"/>
+            <a:ext cx="666925" cy="692092"/>
+          </a:xfrm>
+          <a:prstGeom prst="bentConnector2">
+            <a:avLst/>
+          </a:prstGeom>
+          <a:ln>
+            <a:tailEnd type="triangle"/>
+          </a:ln>
+        </p:spPr>
+        <p:style>
+          <a:lnRef idx="1">
+            <a:schemeClr val="accent1"/>
+          </a:lnRef>
+          <a:fillRef idx="0">
+            <a:schemeClr val="accent1"/>
+          </a:fillRef>
+          <a:effectRef idx="0">
+            <a:schemeClr val="accent1"/>
+          </a:effectRef>
+          <a:fontRef idx="minor">
+            <a:schemeClr val="tx1"/>
+          </a:fontRef>
+        </p:style>
+      </p:cxnSp>
+      <p:cxnSp>
+        <p:nvCxnSpPr>
+          <p:cNvPr id="77" name="Connecteur droit avec flèche 76">
+            <a:extLst>
+              <a:ext uri="{FF2B5EF4-FFF2-40B4-BE49-F238E27FC236}">
+                <a16:creationId xmlns:a16="http://schemas.microsoft.com/office/drawing/2014/main" id="{F0256DF0-9A4D-F906-5558-4EA1A4EC6AC4}"/>
+              </a:ext>
+            </a:extLst>
+          </p:cNvPr>
+          <p:cNvCxnSpPr>
+            <a:stCxn id="38" idx="3"/>
+            <a:endCxn id="39" idx="1"/>
+          </p:cNvCxnSpPr>
+          <p:nvPr/>
+        </p:nvCxnSpPr>
+        <p:spPr>
+          <a:xfrm>
+            <a:off x="9466282" y="5420842"/>
+            <a:ext cx="195041" cy="5748"/>
+          </a:xfrm>
+          <a:prstGeom prst="straightConnector1">
+            <a:avLst/>
+          </a:prstGeom>
+          <a:ln>
+            <a:tailEnd type="triangle"/>
+          </a:ln>
+        </p:spPr>
+        <p:style>
+          <a:lnRef idx="1">
+            <a:schemeClr val="accent1"/>
+          </a:lnRef>
+          <a:fillRef idx="0">
+            <a:schemeClr val="accent1"/>
+          </a:fillRef>
+          <a:effectRef idx="0">
+            <a:schemeClr val="accent1"/>
+          </a:effectRef>
+          <a:fontRef idx="minor">
+            <a:schemeClr val="tx1"/>
+          </a:fontRef>
+        </p:style>
+      </p:cxnSp>
+      <p:cxnSp>
+        <p:nvCxnSpPr>
+          <p:cNvPr id="85" name="Connecteur droit avec flèche 84">
+            <a:extLst>
+              <a:ext uri="{FF2B5EF4-FFF2-40B4-BE49-F238E27FC236}">
+                <a16:creationId xmlns:a16="http://schemas.microsoft.com/office/drawing/2014/main" id="{D6393167-CD56-D7FD-A5D4-364CFB24F497}"/>
+              </a:ext>
+            </a:extLst>
+          </p:cNvPr>
+          <p:cNvCxnSpPr>
+            <a:cxnSpLocks/>
+            <a:stCxn id="39" idx="0"/>
+            <a:endCxn id="40" idx="2"/>
+          </p:cNvCxnSpPr>
+          <p:nvPr/>
+        </p:nvCxnSpPr>
+        <p:spPr>
+          <a:xfrm flipH="1" flipV="1">
+            <a:off x="10352717" y="3799941"/>
+            <a:ext cx="698" cy="1219783"/>
+          </a:xfrm>
+          <a:prstGeom prst="straightConnector1">
+            <a:avLst/>
+          </a:prstGeom>
+          <a:ln>
+            <a:tailEnd type="triangle"/>
+          </a:ln>
+        </p:spPr>
+        <p:style>
+          <a:lnRef idx="1">
+            <a:schemeClr val="accent1"/>
+          </a:lnRef>
+          <a:fillRef idx="0">
+            <a:schemeClr val="accent1"/>
+          </a:fillRef>
+          <a:effectRef idx="0">
+            <a:schemeClr val="accent1"/>
+          </a:effectRef>
+          <a:fontRef idx="minor">
+            <a:schemeClr val="tx1"/>
+          </a:fontRef>
+        </p:style>
+      </p:cxnSp>
+      <p:cxnSp>
+        <p:nvCxnSpPr>
+          <p:cNvPr id="91" name="Connecteur : en angle 90">
+            <a:extLst>
+              <a:ext uri="{FF2B5EF4-FFF2-40B4-BE49-F238E27FC236}">
+                <a16:creationId xmlns:a16="http://schemas.microsoft.com/office/drawing/2014/main" id="{0514B31D-2EBD-B825-7FA8-E1B64CEE08AA}"/>
+              </a:ext>
+            </a:extLst>
+          </p:cNvPr>
+          <p:cNvCxnSpPr>
+            <a:stCxn id="6" idx="3"/>
+            <a:endCxn id="40" idx="1"/>
+          </p:cNvCxnSpPr>
+          <p:nvPr/>
+        </p:nvCxnSpPr>
+        <p:spPr>
+          <a:xfrm>
+            <a:off x="8082098" y="2454103"/>
+            <a:ext cx="1578527" cy="938972"/>
+          </a:xfrm>
+          <a:prstGeom prst="bentConnector3">
+            <a:avLst/>
+          </a:prstGeom>
+          <a:ln>
+            <a:tailEnd type="triangle"/>
+          </a:ln>
+        </p:spPr>
+        <p:style>
+          <a:lnRef idx="1">
+            <a:schemeClr val="accent1"/>
+          </a:lnRef>
+          <a:fillRef idx="0">
+            <a:schemeClr val="accent1"/>
+          </a:fillRef>
+          <a:effectRef idx="0">
+            <a:schemeClr val="accent1"/>
+          </a:effectRef>
+          <a:fontRef idx="minor">
+            <a:schemeClr val="tx1"/>
+          </a:fontRef>
+        </p:style>
+      </p:cxnSp>
+      <p:cxnSp>
+        <p:nvCxnSpPr>
+          <p:cNvPr id="94" name="Connecteur droit avec flèche 93">
+            <a:extLst>
+              <a:ext uri="{FF2B5EF4-FFF2-40B4-BE49-F238E27FC236}">
+                <a16:creationId xmlns:a16="http://schemas.microsoft.com/office/drawing/2014/main" id="{6F270C21-B04A-3EC1-5747-5CC35E6E63EF}"/>
+              </a:ext>
+            </a:extLst>
+          </p:cNvPr>
+          <p:cNvCxnSpPr>
+            <a:cxnSpLocks/>
+            <a:stCxn id="36" idx="2"/>
+            <a:endCxn id="35" idx="0"/>
+          </p:cNvCxnSpPr>
+          <p:nvPr/>
+        </p:nvCxnSpPr>
+        <p:spPr>
+          <a:xfrm>
+            <a:off x="5129520" y="5567649"/>
+            <a:ext cx="349" cy="413742"/>
+          </a:xfrm>
+          <a:prstGeom prst="straightConnector1">
+            <a:avLst/>
+          </a:prstGeom>
+          <a:ln>
+            <a:headEnd type="triangle"/>
+            <a:tailEnd type="triangle"/>
+          </a:ln>
+        </p:spPr>
+        <p:style>
+          <a:lnRef idx="1">
+            <a:schemeClr val="accent1"/>
+          </a:lnRef>
+          <a:fillRef idx="0">
+            <a:schemeClr val="accent1"/>
+          </a:fillRef>
+          <a:effectRef idx="0">
+            <a:schemeClr val="accent1"/>
+          </a:effectRef>
+          <a:fontRef idx="minor">
+            <a:schemeClr val="tx1"/>
+          </a:fontRef>
+        </p:style>
+      </p:cxnSp>
+      <p:sp>
+        <p:nvSpPr>
+          <p:cNvPr id="97" name="Ellipse 96">
+            <a:extLst>
+              <a:ext uri="{FF2B5EF4-FFF2-40B4-BE49-F238E27FC236}">
+                <a16:creationId xmlns:a16="http://schemas.microsoft.com/office/drawing/2014/main" id="{347DDB6E-E264-6860-9E9F-3FF861187FEA}"/>
+              </a:ext>
+            </a:extLst>
+          </p:cNvPr>
+          <p:cNvSpPr/>
+          <p:nvPr/>
+        </p:nvSpPr>
+        <p:spPr>
+          <a:xfrm>
+            <a:off x="9691732" y="2333312"/>
+            <a:ext cx="1321969" cy="328568"/>
+          </a:xfrm>
+          <a:prstGeom prst="ellipse">
+            <a:avLst/>
+          </a:prstGeom>
+        </p:spPr>
+        <p:style>
+          <a:lnRef idx="2">
+            <a:schemeClr val="accent1">
+              <a:shade val="50000"/>
+            </a:schemeClr>
+          </a:lnRef>
+          <a:fillRef idx="1">
+            <a:schemeClr val="accent1"/>
+          </a:fillRef>
+          <a:effectRef idx="0">
+            <a:schemeClr val="accent1"/>
+          </a:effectRef>
+          <a:fontRef idx="minor">
+            <a:schemeClr val="lt1"/>
+          </a:fontRef>
+        </p:style>
+        <p:txBody>
+          <a:bodyPr rtlCol="0" anchor="ctr"/>
+          <a:lstStyle/>
+          <a:p>
+            <a:pPr algn="ctr"/>
+            <a:r>
+              <a:rPr lang="fr-FR" dirty="0"/>
+              <a:t>Moteurs</a:t>
+            </a:r>
+          </a:p>
+        </p:txBody>
+      </p:sp>
+      <p:cxnSp>
+        <p:nvCxnSpPr>
+          <p:cNvPr id="99" name="Connecteur droit avec flèche 98">
+            <a:extLst>
+              <a:ext uri="{FF2B5EF4-FFF2-40B4-BE49-F238E27FC236}">
+                <a16:creationId xmlns:a16="http://schemas.microsoft.com/office/drawing/2014/main" id="{B6E6B8BD-6DC5-467F-595F-12C152D9FE05}"/>
+              </a:ext>
+            </a:extLst>
+          </p:cNvPr>
+          <p:cNvCxnSpPr>
+            <a:stCxn id="40" idx="0"/>
+            <a:endCxn id="97" idx="4"/>
+          </p:cNvCxnSpPr>
+          <p:nvPr/>
+        </p:nvCxnSpPr>
+        <p:spPr>
+          <a:xfrm flipV="1">
+            <a:off x="10352717" y="2661880"/>
+            <a:ext cx="0" cy="324329"/>
+          </a:xfrm>
+          <a:prstGeom prst="straightConnector1">
+            <a:avLst/>
+          </a:prstGeom>
+          <a:ln>
+            <a:headEnd type="triangle"/>
+            <a:tailEnd type="triangle"/>
+          </a:ln>
+        </p:spPr>
+        <p:style>
+          <a:lnRef idx="1">
+            <a:schemeClr val="accent1"/>
+          </a:lnRef>
+          <a:fillRef idx="0">
+            <a:schemeClr val="accent1"/>
+          </a:fillRef>
+          <a:effectRef idx="0">
+            <a:schemeClr val="accent1"/>
+          </a:effectRef>
+          <a:fontRef idx="minor">
+            <a:schemeClr val="tx1"/>
+          </a:fontRef>
+        </p:style>
+      </p:cxnSp>
+    </p:spTree>
+    <p:extLst>
+      <p:ext uri="{BB962C8B-B14F-4D97-AF65-F5344CB8AC3E}">
+        <p14:creationId xmlns:p14="http://schemas.microsoft.com/office/powerpoint/2010/main" val="2709414635"/>
+      </p:ext>
+    </p:extLst>
+  </p:cSld>
+  <p:clrMapOvr>
+    <a:masterClrMapping/>
+  </p:clrMapOvr>
+</p:sld>
+</file>
+
+<file path=ppt/slides/slide11.xml><?xml version="1.0" encoding="utf-8"?>
 <p:sld xmlns:a="http://schemas.openxmlformats.org/drawingml/2006/main" xmlns:r="http://schemas.openxmlformats.org/officeDocument/2006/relationships" xmlns:p="http://schemas.openxmlformats.org/presentationml/2006/main">
   <p:cSld>
     <p:spTree>
@@ -9401,7 +10994,7 @@
 </p:sld>
 </file>
 
-<file path=ppt/slides/slide11.xml><?xml version="1.0" encoding="utf-8"?>
+<file path=ppt/slides/slide12.xml><?xml version="1.0" encoding="utf-8"?>
 <p:sld xmlns:a="http://schemas.openxmlformats.org/drawingml/2006/main" xmlns:r="http://schemas.openxmlformats.org/officeDocument/2006/relationships" xmlns:p="http://schemas.openxmlformats.org/presentationml/2006/main">
   <p:cSld>
     <p:spTree>
@@ -10037,7 +11630,7 @@
 </p:sld>
 </file>
 
-<file path=ppt/slides/slide12.xml><?xml version="1.0" encoding="utf-8"?>
+<file path=ppt/slides/slide13.xml><?xml version="1.0" encoding="utf-8"?>
 <p:sld xmlns:a="http://schemas.openxmlformats.org/drawingml/2006/main" xmlns:r="http://schemas.openxmlformats.org/officeDocument/2006/relationships" xmlns:p="http://schemas.openxmlformats.org/presentationml/2006/main">
   <p:cSld>
     <p:spTree>
@@ -10228,22 +11821,6 @@
             </a:r>
           </a:p>
           <a:p>
-            <a:pPr>
-              <a:buFont typeface="Arial" panose="020B0604020202020204" pitchFamily="34" charset="0"/>
-              <a:buChar char="•"/>
-            </a:pPr>
-            <a:r>
-              <a:rPr lang="fr-FR" sz="1600" b="0" i="0" dirty="0">
-                <a:solidFill>
-                  <a:srgbClr val="000000"/>
-                </a:solidFill>
-                <a:effectLst/>
-                <a:latin typeface="arial" panose="020B0604020202020204" pitchFamily="34" charset="0"/>
-              </a:rPr>
-              <a:t>Démonstration du fonctionnement de l'algorithme Dijkstra de calcul de chemin</a:t>
-            </a:r>
-          </a:p>
-          <a:p>
             <a:pPr algn="l">
               <a:buFont typeface="Arial" panose="020B0604020202020204" pitchFamily="34" charset="0"/>
               <a:buChar char="•"/>
@@ -10258,6 +11835,28 @@
               </a:rPr>
               <a:t>Schéma du prétraitement IMU</a:t>
             </a:r>
+          </a:p>
+          <a:p>
+            <a:pPr algn="l">
+              <a:buFont typeface="Arial" panose="020B0604020202020204" pitchFamily="34" charset="0"/>
+              <a:buChar char="•"/>
+            </a:pPr>
+            <a:r>
+              <a:rPr lang="fr-FR" sz="1600" dirty="0">
+                <a:solidFill>
+                  <a:srgbClr val="000000"/>
+                </a:solidFill>
+                <a:latin typeface="arial" panose="020B0604020202020204" pitchFamily="34" charset="0"/>
+              </a:rPr>
+              <a:t>Schéma du Dijkstra</a:t>
+            </a:r>
+            <a:endParaRPr lang="fr-FR" sz="1600" b="0" i="0" dirty="0">
+              <a:solidFill>
+                <a:srgbClr val="000000"/>
+              </a:solidFill>
+              <a:effectLst/>
+              <a:latin typeface="arial" panose="020B0604020202020204" pitchFamily="34" charset="0"/>
+            </a:endParaRPr>
           </a:p>
           <a:p>
             <a:pPr algn="l">
@@ -10565,15 +12164,45 @@
           <a:p>
             <a:r>
               <a:rPr lang="fr-FR" dirty="0"/>
-              <a:t>FPGA: Démonstration – Algorithme Dijkstra</a:t>
+              <a:t>FPGA: Schéma du prétraitement IMU</a:t>
             </a:r>
           </a:p>
         </p:txBody>
       </p:sp>
+      <p:pic>
+        <p:nvPicPr>
+          <p:cNvPr id="4" name="Image 3">
+            <a:extLst>
+              <a:ext uri="{FF2B5EF4-FFF2-40B4-BE49-F238E27FC236}">
+                <a16:creationId xmlns:a16="http://schemas.microsoft.com/office/drawing/2014/main" id="{63FD58AC-B891-51C3-2B78-04786650DDA7}"/>
+              </a:ext>
+            </a:extLst>
+          </p:cNvPr>
+          <p:cNvPicPr>
+            <a:picLocks noChangeAspect="1"/>
+          </p:cNvPicPr>
+          <p:nvPr/>
+        </p:nvPicPr>
+        <p:blipFill>
+          <a:blip r:embed="rId2"/>
+          <a:stretch>
+            <a:fillRect/>
+          </a:stretch>
+        </p:blipFill>
+        <p:spPr>
+          <a:xfrm>
+            <a:off x="1490124" y="1412689"/>
+            <a:ext cx="9211752" cy="4803553"/>
+          </a:xfrm>
+          <a:prstGeom prst="rect">
+            <a:avLst/>
+          </a:prstGeom>
+        </p:spPr>
+      </p:pic>
     </p:spTree>
     <p:extLst>
       <p:ext uri="{BB962C8B-B14F-4D97-AF65-F5344CB8AC3E}">
-        <p14:creationId xmlns:p14="http://schemas.microsoft.com/office/powerpoint/2010/main" val="2206887346"/>
+        <p14:creationId xmlns:p14="http://schemas.microsoft.com/office/powerpoint/2010/main" val="205039471"/>
       </p:ext>
     </p:extLst>
   </p:cSld>
@@ -10628,10 +12257,130 @@
           </a:p>
         </p:txBody>
       </p:sp>
+      <p:pic>
+        <p:nvPicPr>
+          <p:cNvPr id="5" name="Image 4">
+            <a:extLst>
+              <a:ext uri="{FF2B5EF4-FFF2-40B4-BE49-F238E27FC236}">
+                <a16:creationId xmlns:a16="http://schemas.microsoft.com/office/drawing/2014/main" id="{71A30D3B-8FA9-836F-A1E3-716B9EE2FFC7}"/>
+              </a:ext>
+            </a:extLst>
+          </p:cNvPr>
+          <p:cNvPicPr>
+            <a:picLocks noChangeAspect="1"/>
+          </p:cNvPicPr>
+          <p:nvPr/>
+        </p:nvPicPr>
+        <p:blipFill>
+          <a:blip r:embed="rId2"/>
+          <a:stretch>
+            <a:fillRect/>
+          </a:stretch>
+        </p:blipFill>
+        <p:spPr>
+          <a:xfrm>
+            <a:off x="0" y="1305731"/>
+            <a:ext cx="12192000" cy="3298812"/>
+          </a:xfrm>
+          <a:prstGeom prst="rect">
+            <a:avLst/>
+          </a:prstGeom>
+        </p:spPr>
+      </p:pic>
+      <p:pic>
+        <p:nvPicPr>
+          <p:cNvPr id="6" name="Image 5">
+            <a:extLst>
+              <a:ext uri="{FF2B5EF4-FFF2-40B4-BE49-F238E27FC236}">
+                <a16:creationId xmlns:a16="http://schemas.microsoft.com/office/drawing/2014/main" id="{06CB7341-081B-E5DA-F193-A9415AD58507}"/>
+              </a:ext>
+            </a:extLst>
+          </p:cNvPr>
+          <p:cNvPicPr>
+            <a:picLocks noChangeAspect="1"/>
+          </p:cNvPicPr>
+          <p:nvPr/>
+        </p:nvPicPr>
+        <p:blipFill>
+          <a:blip r:embed="rId3"/>
+          <a:stretch>
+            <a:fillRect/>
+          </a:stretch>
+        </p:blipFill>
+        <p:spPr>
+          <a:xfrm>
+            <a:off x="6696773" y="4863865"/>
+            <a:ext cx="3621601" cy="1376807"/>
+          </a:xfrm>
+          <a:prstGeom prst="rect">
+            <a:avLst/>
+          </a:prstGeom>
+        </p:spPr>
+      </p:pic>
+      <p:sp>
+        <p:nvSpPr>
+          <p:cNvPr id="8" name="ZoneTexte 7">
+            <a:extLst>
+              <a:ext uri="{FF2B5EF4-FFF2-40B4-BE49-F238E27FC236}">
+                <a16:creationId xmlns:a16="http://schemas.microsoft.com/office/drawing/2014/main" id="{0C029189-0A4D-2DD2-23EE-C6D1434589DA}"/>
+              </a:ext>
+            </a:extLst>
+          </p:cNvPr>
+          <p:cNvSpPr txBox="1"/>
+          <p:nvPr/>
+        </p:nvSpPr>
+        <p:spPr>
+          <a:xfrm>
+            <a:off x="472142" y="4863865"/>
+            <a:ext cx="6224631" cy="738664"/>
+          </a:xfrm>
+          <a:prstGeom prst="rect">
+            <a:avLst/>
+          </a:prstGeom>
+          <a:noFill/>
+        </p:spPr>
+        <p:txBody>
+          <a:bodyPr wrap="square" rtlCol="0">
+            <a:spAutoFit/>
+          </a:bodyPr>
+          <a:lstStyle/>
+          <a:p>
+            <a:r>
+              <a:rPr lang="fr-FR" dirty="0"/>
+              <a:t>Read </a:t>
+            </a:r>
+            <a:r>
+              <a:rPr lang="fr-FR" dirty="0" err="1"/>
+              <a:t>acc_x</a:t>
+            </a:r>
+            <a:r>
+              <a:rPr lang="fr-FR" dirty="0"/>
+              <a:t> = not (0011011100100000) = 1100100011011111 = 0xC8DF</a:t>
+            </a:r>
+          </a:p>
+          <a:p>
+            <a:endParaRPr lang="fr-FR" dirty="0"/>
+          </a:p>
+          <a:p>
+            <a:r>
+              <a:rPr lang="fr-FR" dirty="0"/>
+              <a:t>Read </a:t>
+            </a:r>
+            <a:r>
+              <a:rPr lang="fr-FR" dirty="0" err="1"/>
+              <a:t>acc_y</a:t>
+            </a:r>
+            <a:r>
+              <a:rPr lang="fr-FR" dirty="0"/>
+              <a:t> = not(0000110000111000) = 1111001111000111 = 0xF3C7</a:t>
+            </a:r>
+          </a:p>
+        </p:txBody>
+      </p:sp>
     </p:spTree>
     <p:extLst>
       <p:ext uri="{BB962C8B-B14F-4D97-AF65-F5344CB8AC3E}">
-        <p14:creationId xmlns:p14="http://schemas.microsoft.com/office/powerpoint/2010/main" val="205039471"/>
+        <p14:creationId xmlns:p14="http://schemas.microsoft.com/office/powerpoint/2010/main" val="23424022"/>
       </p:ext>
     </p:extLst>
   </p:cSld>
@@ -10642,6 +12391,94 @@
 </file>
 
 <file path=ppt/slides/slide7.xml><?xml version="1.0" encoding="utf-8"?>
+<p:sld xmlns:a="http://schemas.openxmlformats.org/drawingml/2006/main" xmlns:r="http://schemas.openxmlformats.org/officeDocument/2006/relationships" xmlns:p="http://schemas.openxmlformats.org/presentationml/2006/main">
+  <p:cSld>
+    <p:spTree>
+      <p:nvGrpSpPr>
+        <p:cNvPr id="1" name=""/>
+        <p:cNvGrpSpPr/>
+        <p:nvPr/>
+      </p:nvGrpSpPr>
+      <p:grpSpPr>
+        <a:xfrm>
+          <a:off x="0" y="0"/>
+          <a:ext cx="0" cy="0"/>
+          <a:chOff x="0" y="0"/>
+          <a:chExt cx="0" cy="0"/>
+        </a:xfrm>
+      </p:grpSpPr>
+      <p:sp>
+        <p:nvSpPr>
+          <p:cNvPr id="2" name="Titre 1">
+            <a:extLst>
+              <a:ext uri="{FF2B5EF4-FFF2-40B4-BE49-F238E27FC236}">
+                <a16:creationId xmlns:a16="http://schemas.microsoft.com/office/drawing/2014/main" id="{092DC696-2BCF-1747-3511-B584B1ED5EED}"/>
+              </a:ext>
+            </a:extLst>
+          </p:cNvPr>
+          <p:cNvSpPr>
+            <a:spLocks noGrp="1"/>
+          </p:cNvSpPr>
+          <p:nvPr>
+            <p:ph type="title"/>
+          </p:nvPr>
+        </p:nvSpPr>
+        <p:spPr/>
+        <p:txBody>
+          <a:bodyPr/>
+          <a:lstStyle/>
+          <a:p>
+            <a:r>
+              <a:rPr lang="fr-FR" dirty="0"/>
+              <a:t>Schéma du Dijkstra</a:t>
+            </a:r>
+          </a:p>
+        </p:txBody>
+      </p:sp>
+      <p:pic>
+        <p:nvPicPr>
+          <p:cNvPr id="5" name="Image 4">
+            <a:extLst>
+              <a:ext uri="{FF2B5EF4-FFF2-40B4-BE49-F238E27FC236}">
+                <a16:creationId xmlns:a16="http://schemas.microsoft.com/office/drawing/2014/main" id="{190C0558-4A51-324A-05FD-BA6FBFD28A17}"/>
+              </a:ext>
+            </a:extLst>
+          </p:cNvPr>
+          <p:cNvPicPr>
+            <a:picLocks noChangeAspect="1"/>
+          </p:cNvPicPr>
+          <p:nvPr/>
+        </p:nvPicPr>
+        <p:blipFill>
+          <a:blip r:embed="rId2"/>
+          <a:stretch>
+            <a:fillRect/>
+          </a:stretch>
+        </p:blipFill>
+        <p:spPr>
+          <a:xfrm>
+            <a:off x="950254" y="1613508"/>
+            <a:ext cx="9475035" cy="4991494"/>
+          </a:xfrm>
+          <a:prstGeom prst="rect">
+            <a:avLst/>
+          </a:prstGeom>
+        </p:spPr>
+      </p:pic>
+    </p:spTree>
+    <p:extLst>
+      <p:ext uri="{BB962C8B-B14F-4D97-AF65-F5344CB8AC3E}">
+        <p14:creationId xmlns:p14="http://schemas.microsoft.com/office/powerpoint/2010/main" val="2960113335"/>
+      </p:ext>
+    </p:extLst>
+  </p:cSld>
+  <p:clrMapOvr>
+    <a:masterClrMapping/>
+  </p:clrMapOvr>
+</p:sld>
+</file>
+
+<file path=ppt/slides/slide8.xml><?xml version="1.0" encoding="utf-8"?>
 <p:sld xmlns:a="http://schemas.openxmlformats.org/drawingml/2006/main" xmlns:r="http://schemas.openxmlformats.org/officeDocument/2006/relationships" xmlns:p="http://schemas.openxmlformats.org/presentationml/2006/main">
   <p:cSld>
     <p:spTree>
@@ -10686,6 +12523,160 @@
           </a:p>
         </p:txBody>
       </p:sp>
+      <p:sp>
+        <p:nvSpPr>
+          <p:cNvPr id="3" name="ZoneTexte 2">
+            <a:extLst>
+              <a:ext uri="{FF2B5EF4-FFF2-40B4-BE49-F238E27FC236}">
+                <a16:creationId xmlns:a16="http://schemas.microsoft.com/office/drawing/2014/main" id="{12BF6AB0-410E-62EB-01A7-8FF690B33FED}"/>
+              </a:ext>
+            </a:extLst>
+          </p:cNvPr>
+          <p:cNvSpPr txBox="1"/>
+          <p:nvPr/>
+        </p:nvSpPr>
+        <p:spPr>
+          <a:xfrm>
+            <a:off x="424896" y="1632414"/>
+            <a:ext cx="5469767" cy="738664"/>
+          </a:xfrm>
+          <a:prstGeom prst="rect">
+            <a:avLst/>
+          </a:prstGeom>
+          <a:noFill/>
+        </p:spPr>
+        <p:txBody>
+          <a:bodyPr wrap="none" rtlCol="0">
+            <a:spAutoFit/>
+          </a:bodyPr>
+          <a:lstStyle/>
+          <a:p>
+            <a:r>
+              <a:rPr lang="fr-FR" dirty="0"/>
+              <a:t>Mise en place d’une communication avec le soft via des AXI 4 lite: </a:t>
+            </a:r>
+          </a:p>
+          <a:p>
+            <a:pPr marL="285750" lvl="4" indent="-285750">
+              <a:buFont typeface="Arial" panose="020B0604020202020204" pitchFamily="34" charset="0"/>
+              <a:buChar char="•"/>
+            </a:pPr>
+            <a:r>
+              <a:rPr lang="fr-FR" dirty="0"/>
+              <a:t>Plus de lectures dans la RAM</a:t>
+            </a:r>
+          </a:p>
+          <a:p>
+            <a:pPr marL="285750" lvl="4" indent="-285750">
+              <a:buFont typeface="Arial" panose="020B0604020202020204" pitchFamily="34" charset="0"/>
+              <a:buChar char="•"/>
+            </a:pPr>
+            <a:r>
+              <a:rPr lang="fr-FR" dirty="0"/>
+              <a:t>Simple d’accès pour le soft et plus simple à géré côté FPGA</a:t>
+            </a:r>
+          </a:p>
+        </p:txBody>
+      </p:sp>
+      <p:sp>
+        <p:nvSpPr>
+          <p:cNvPr id="5" name="ZoneTexte 4">
+            <a:extLst>
+              <a:ext uri="{FF2B5EF4-FFF2-40B4-BE49-F238E27FC236}">
+                <a16:creationId xmlns:a16="http://schemas.microsoft.com/office/drawing/2014/main" id="{AEC2DCEE-5732-B584-E730-7D69337A6C7B}"/>
+              </a:ext>
+            </a:extLst>
+          </p:cNvPr>
+          <p:cNvSpPr txBox="1"/>
+          <p:nvPr/>
+        </p:nvSpPr>
+        <p:spPr>
+          <a:xfrm>
+            <a:off x="424896" y="2908057"/>
+            <a:ext cx="11479081" cy="523220"/>
+          </a:xfrm>
+          <a:prstGeom prst="rect">
+            <a:avLst/>
+          </a:prstGeom>
+          <a:noFill/>
+        </p:spPr>
+        <p:txBody>
+          <a:bodyPr wrap="square">
+            <a:spAutoFit/>
+          </a:bodyPr>
+          <a:lstStyle/>
+          <a:p>
+            <a:r>
+              <a:rPr lang="fr-FR" dirty="0"/>
+              <a:t>Tests sur Vitis avant d’effectuer des tests sur </a:t>
+            </a:r>
+            <a:r>
+              <a:rPr lang="fr-FR" dirty="0" err="1"/>
+              <a:t>Pynq</a:t>
+            </a:r>
+            <a:r>
+              <a:rPr lang="fr-FR" dirty="0"/>
+              <a:t> </a:t>
+            </a:r>
+            <a:r>
+              <a:rPr lang="fr-FR" dirty="0">
+                <a:sym typeface="Wingdings" panose="05000000000000000000" pitchFamily="2" charset="2"/>
+              </a:rPr>
+              <a:t> Vitis IDE permet de regarder plus facilement dans les différentes adresses mémoires.</a:t>
+            </a:r>
+            <a:endParaRPr lang="fr-FR" dirty="0"/>
+          </a:p>
+          <a:p>
+            <a:r>
+              <a:rPr lang="fr-FR" dirty="0"/>
+              <a:t>Développement de drivers pour les différents </a:t>
+            </a:r>
+            <a:r>
+              <a:rPr lang="fr-FR" dirty="0" err="1"/>
+              <a:t>IPs</a:t>
+            </a:r>
+            <a:r>
+              <a:rPr lang="fr-FR" dirty="0"/>
+              <a:t> créés</a:t>
+            </a:r>
+          </a:p>
+        </p:txBody>
+      </p:sp>
+      <p:sp>
+        <p:nvSpPr>
+          <p:cNvPr id="6" name="ZoneTexte 5">
+            <a:extLst>
+              <a:ext uri="{FF2B5EF4-FFF2-40B4-BE49-F238E27FC236}">
+                <a16:creationId xmlns:a16="http://schemas.microsoft.com/office/drawing/2014/main" id="{5DE4A867-B48A-3A45-DA0E-1D94D853393B}"/>
+              </a:ext>
+            </a:extLst>
+          </p:cNvPr>
+          <p:cNvSpPr txBox="1"/>
+          <p:nvPr/>
+        </p:nvSpPr>
+        <p:spPr>
+          <a:xfrm>
+            <a:off x="424896" y="4496624"/>
+            <a:ext cx="8440131" cy="307777"/>
+          </a:xfrm>
+          <a:prstGeom prst="rect">
+            <a:avLst/>
+          </a:prstGeom>
+          <a:noFill/>
+        </p:spPr>
+        <p:txBody>
+          <a:bodyPr wrap="none" rtlCol="0">
+            <a:spAutoFit/>
+          </a:bodyPr>
+          <a:lstStyle/>
+          <a:p>
+            <a:r>
+              <a:rPr lang="fr-FR" dirty="0"/>
+              <a:t>En attendant de recevoir le NFC et un nouvel IMU : début du développement du code pour les Ultrasons </a:t>
+            </a:r>
+          </a:p>
+        </p:txBody>
+      </p:sp>
     </p:spTree>
     <p:extLst>
       <p:ext uri="{BB962C8B-B14F-4D97-AF65-F5344CB8AC3E}">
@@ -10699,7 +12690,7 @@
 </p:sld>
 </file>
 
-<file path=ppt/slides/slide8.xml><?xml version="1.0" encoding="utf-8"?>
+<file path=ppt/slides/slide9.xml><?xml version="1.0" encoding="utf-8"?>
 <p:sld xmlns:a="http://schemas.openxmlformats.org/drawingml/2006/main" xmlns:r="http://schemas.openxmlformats.org/officeDocument/2006/relationships" xmlns:p="http://schemas.openxmlformats.org/presentationml/2006/main">
   <p:cSld>
     <p:spTree>
@@ -10843,1598 +12834,6 @@
     <p:extLst>
       <p:ext uri="{BB962C8B-B14F-4D97-AF65-F5344CB8AC3E}">
         <p14:creationId xmlns:p14="http://schemas.microsoft.com/office/powerpoint/2010/main" val="1968962188"/>
-      </p:ext>
-    </p:extLst>
-  </p:cSld>
-  <p:clrMapOvr>
-    <a:masterClrMapping/>
-  </p:clrMapOvr>
-</p:sld>
-</file>
-
-<file path=ppt/slides/slide9.xml><?xml version="1.0" encoding="utf-8"?>
-<p:sld xmlns:a="http://schemas.openxmlformats.org/drawingml/2006/main" xmlns:r="http://schemas.openxmlformats.org/officeDocument/2006/relationships" xmlns:p="http://schemas.openxmlformats.org/presentationml/2006/main">
-  <p:cSld>
-    <p:spTree>
-      <p:nvGrpSpPr>
-        <p:cNvPr id="1" name=""/>
-        <p:cNvGrpSpPr/>
-        <p:nvPr/>
-      </p:nvGrpSpPr>
-      <p:grpSpPr>
-        <a:xfrm>
-          <a:off x="0" y="0"/>
-          <a:ext cx="0" cy="0"/>
-          <a:chOff x="0" y="0"/>
-          <a:chExt cx="0" cy="0"/>
-        </a:xfrm>
-      </p:grpSpPr>
-      <p:sp>
-        <p:nvSpPr>
-          <p:cNvPr id="2" name="Titre 1">
-            <a:extLst>
-              <a:ext uri="{FF2B5EF4-FFF2-40B4-BE49-F238E27FC236}">
-                <a16:creationId xmlns:a16="http://schemas.microsoft.com/office/drawing/2014/main" id="{EDDD4FAF-1AF8-4391-9A8A-F1F63DD06F1E}"/>
-              </a:ext>
-            </a:extLst>
-          </p:cNvPr>
-          <p:cNvSpPr>
-            <a:spLocks noGrp="1"/>
-          </p:cNvSpPr>
-          <p:nvPr>
-            <p:ph type="title"/>
-          </p:nvPr>
-        </p:nvSpPr>
-        <p:spPr/>
-        <p:txBody>
-          <a:bodyPr/>
-          <a:lstStyle/>
-          <a:p>
-            <a:r>
-              <a:rPr lang="fr-FR" dirty="0"/>
-              <a:t>Soft: Architecture de projet Soft</a:t>
-            </a:r>
-          </a:p>
-        </p:txBody>
-      </p:sp>
-      <p:sp>
-        <p:nvSpPr>
-          <p:cNvPr id="4" name="Rectangle : coins arrondis 3">
-            <a:extLst>
-              <a:ext uri="{FF2B5EF4-FFF2-40B4-BE49-F238E27FC236}">
-                <a16:creationId xmlns:a16="http://schemas.microsoft.com/office/drawing/2014/main" id="{7A135F26-5CA7-7FDE-DADC-A0186D3A1185}"/>
-              </a:ext>
-            </a:extLst>
-          </p:cNvPr>
-          <p:cNvSpPr/>
-          <p:nvPr/>
-        </p:nvSpPr>
-        <p:spPr>
-          <a:xfrm>
-            <a:off x="4437428" y="2988578"/>
-            <a:ext cx="1384184" cy="813732"/>
-          </a:xfrm>
-          <a:prstGeom prst="roundRect">
-            <a:avLst/>
-          </a:prstGeom>
-          <a:noFill/>
-        </p:spPr>
-        <p:style>
-          <a:lnRef idx="2">
-            <a:schemeClr val="accent1">
-              <a:shade val="50000"/>
-            </a:schemeClr>
-          </a:lnRef>
-          <a:fillRef idx="1">
-            <a:schemeClr val="accent1"/>
-          </a:fillRef>
-          <a:effectRef idx="0">
-            <a:schemeClr val="accent1"/>
-          </a:effectRef>
-          <a:fontRef idx="minor">
-            <a:schemeClr val="lt1"/>
-          </a:fontRef>
-        </p:style>
-        <p:txBody>
-          <a:bodyPr rtlCol="0" anchor="ctr"/>
-          <a:lstStyle/>
-          <a:p>
-            <a:pPr algn="ctr"/>
-            <a:r>
-              <a:rPr lang="fr-FR" dirty="0">
-                <a:solidFill>
-                  <a:schemeClr val="tx1"/>
-                </a:solidFill>
-              </a:rPr>
-              <a:t>Gestionnaire de mission</a:t>
-            </a:r>
-          </a:p>
-        </p:txBody>
-      </p:sp>
-      <p:sp>
-        <p:nvSpPr>
-          <p:cNvPr id="5" name="Rectangle : coins arrondis 4">
-            <a:extLst>
-              <a:ext uri="{FF2B5EF4-FFF2-40B4-BE49-F238E27FC236}">
-                <a16:creationId xmlns:a16="http://schemas.microsoft.com/office/drawing/2014/main" id="{23CE6665-AA1B-2215-DA18-AD9439768906}"/>
-              </a:ext>
-            </a:extLst>
-          </p:cNvPr>
-          <p:cNvSpPr/>
-          <p:nvPr/>
-        </p:nvSpPr>
-        <p:spPr>
-          <a:xfrm>
-            <a:off x="6697914" y="3940185"/>
-            <a:ext cx="1384184" cy="813732"/>
-          </a:xfrm>
-          <a:prstGeom prst="roundRect">
-            <a:avLst/>
-          </a:prstGeom>
-          <a:noFill/>
-        </p:spPr>
-        <p:style>
-          <a:lnRef idx="2">
-            <a:schemeClr val="accent1">
-              <a:shade val="50000"/>
-            </a:schemeClr>
-          </a:lnRef>
-          <a:fillRef idx="1">
-            <a:schemeClr val="accent1"/>
-          </a:fillRef>
-          <a:effectRef idx="0">
-            <a:schemeClr val="accent1"/>
-          </a:effectRef>
-          <a:fontRef idx="minor">
-            <a:schemeClr val="lt1"/>
-          </a:fontRef>
-        </p:style>
-        <p:txBody>
-          <a:bodyPr rtlCol="0" anchor="ctr"/>
-          <a:lstStyle/>
-          <a:p>
-            <a:pPr algn="ctr"/>
-            <a:r>
-              <a:rPr lang="fr-FR" dirty="0">
-                <a:solidFill>
-                  <a:schemeClr val="tx1"/>
-                </a:solidFill>
-              </a:rPr>
-              <a:t>Auto</a:t>
-            </a:r>
-          </a:p>
-        </p:txBody>
-      </p:sp>
-      <p:sp>
-        <p:nvSpPr>
-          <p:cNvPr id="6" name="Rectangle : coins arrondis 5">
-            <a:extLst>
-              <a:ext uri="{FF2B5EF4-FFF2-40B4-BE49-F238E27FC236}">
-                <a16:creationId xmlns:a16="http://schemas.microsoft.com/office/drawing/2014/main" id="{804C6B43-D218-7EFA-48A1-7D3E48F576E6}"/>
-              </a:ext>
-            </a:extLst>
-          </p:cNvPr>
-          <p:cNvSpPr/>
-          <p:nvPr/>
-        </p:nvSpPr>
-        <p:spPr>
-          <a:xfrm>
-            <a:off x="6697914" y="2047237"/>
-            <a:ext cx="1384184" cy="813732"/>
-          </a:xfrm>
-          <a:prstGeom prst="roundRect">
-            <a:avLst/>
-          </a:prstGeom>
-          <a:noFill/>
-        </p:spPr>
-        <p:style>
-          <a:lnRef idx="2">
-            <a:schemeClr val="accent1">
-              <a:shade val="50000"/>
-            </a:schemeClr>
-          </a:lnRef>
-          <a:fillRef idx="1">
-            <a:schemeClr val="accent1"/>
-          </a:fillRef>
-          <a:effectRef idx="0">
-            <a:schemeClr val="accent1"/>
-          </a:effectRef>
-          <a:fontRef idx="minor">
-            <a:schemeClr val="lt1"/>
-          </a:fontRef>
-        </p:style>
-        <p:txBody>
-          <a:bodyPr rtlCol="0" anchor="ctr"/>
-          <a:lstStyle/>
-          <a:p>
-            <a:pPr algn="ctr"/>
-            <a:r>
-              <a:rPr lang="fr-FR" dirty="0">
-                <a:solidFill>
-                  <a:schemeClr val="tx1"/>
-                </a:solidFill>
-              </a:rPr>
-              <a:t>Manual</a:t>
-            </a:r>
-          </a:p>
-        </p:txBody>
-      </p:sp>
-      <p:grpSp>
-        <p:nvGrpSpPr>
-          <p:cNvPr id="33" name="Groupe 32">
-            <a:extLst>
-              <a:ext uri="{FF2B5EF4-FFF2-40B4-BE49-F238E27FC236}">
-                <a16:creationId xmlns:a16="http://schemas.microsoft.com/office/drawing/2014/main" id="{2D9B23F7-E0D5-87C4-9005-CC83FE174E7F}"/>
-              </a:ext>
-            </a:extLst>
-          </p:cNvPr>
-          <p:cNvGrpSpPr/>
-          <p:nvPr/>
-        </p:nvGrpSpPr>
-        <p:grpSpPr>
-          <a:xfrm>
-            <a:off x="175469" y="2403628"/>
-            <a:ext cx="3394046" cy="1344351"/>
-            <a:chOff x="175470" y="2950848"/>
-            <a:chExt cx="3394046" cy="1344351"/>
-          </a:xfrm>
-        </p:grpSpPr>
-        <p:sp>
-          <p:nvSpPr>
-            <p:cNvPr id="9" name="Ellipse 8">
-              <a:extLst>
-                <a:ext uri="{FF2B5EF4-FFF2-40B4-BE49-F238E27FC236}">
-                  <a16:creationId xmlns:a16="http://schemas.microsoft.com/office/drawing/2014/main" id="{1F63B939-20E0-B262-1715-3DC5B33C6958}"/>
-                </a:ext>
-              </a:extLst>
-            </p:cNvPr>
-            <p:cNvSpPr/>
-            <p:nvPr/>
-          </p:nvSpPr>
-          <p:spPr>
-            <a:xfrm>
-              <a:off x="183859" y="2950848"/>
-              <a:ext cx="1451994" cy="362279"/>
-            </a:xfrm>
-            <a:prstGeom prst="ellipse">
-              <a:avLst/>
-            </a:prstGeom>
-          </p:spPr>
-          <p:style>
-            <a:lnRef idx="2">
-              <a:schemeClr val="accent1">
-                <a:shade val="50000"/>
-              </a:schemeClr>
-            </a:lnRef>
-            <a:fillRef idx="1">
-              <a:schemeClr val="accent1"/>
-            </a:fillRef>
-            <a:effectRef idx="0">
-              <a:schemeClr val="accent1"/>
-            </a:effectRef>
-            <a:fontRef idx="minor">
-              <a:schemeClr val="lt1"/>
-            </a:fontRef>
-          </p:style>
-          <p:txBody>
-            <a:bodyPr rtlCol="0" anchor="ctr"/>
-            <a:lstStyle/>
-            <a:p>
-              <a:pPr algn="ctr"/>
-              <a:r>
-                <a:rPr lang="fr-FR" dirty="0"/>
-                <a:t>IMU</a:t>
-              </a:r>
-            </a:p>
-          </p:txBody>
-        </p:sp>
-        <p:sp>
-          <p:nvSpPr>
-            <p:cNvPr id="10" name="Ellipse 9">
-              <a:extLst>
-                <a:ext uri="{FF2B5EF4-FFF2-40B4-BE49-F238E27FC236}">
-                  <a16:creationId xmlns:a16="http://schemas.microsoft.com/office/drawing/2014/main" id="{FA76DC8F-024C-6785-3F8B-DEDA52680F40}"/>
-                </a:ext>
-              </a:extLst>
-            </p:cNvPr>
-            <p:cNvSpPr/>
-            <p:nvPr/>
-          </p:nvSpPr>
-          <p:spPr>
-            <a:xfrm>
-              <a:off x="175470" y="3509472"/>
-              <a:ext cx="1451994" cy="362279"/>
-            </a:xfrm>
-            <a:prstGeom prst="ellipse">
-              <a:avLst/>
-            </a:prstGeom>
-          </p:spPr>
-          <p:style>
-            <a:lnRef idx="2">
-              <a:schemeClr val="accent1">
-                <a:shade val="50000"/>
-              </a:schemeClr>
-            </a:lnRef>
-            <a:fillRef idx="1">
-              <a:schemeClr val="accent1"/>
-            </a:fillRef>
-            <a:effectRef idx="0">
-              <a:schemeClr val="accent1"/>
-            </a:effectRef>
-            <a:fontRef idx="minor">
-              <a:schemeClr val="lt1"/>
-            </a:fontRef>
-          </p:style>
-          <p:txBody>
-            <a:bodyPr rtlCol="0" anchor="ctr"/>
-            <a:lstStyle/>
-            <a:p>
-              <a:pPr algn="ctr"/>
-              <a:r>
-                <a:rPr lang="fr-FR" dirty="0"/>
-                <a:t>Odométrie</a:t>
-              </a:r>
-            </a:p>
-          </p:txBody>
-        </p:sp>
-        <p:sp>
-          <p:nvSpPr>
-            <p:cNvPr id="11" name="Ellipse 10">
-              <a:extLst>
-                <a:ext uri="{FF2B5EF4-FFF2-40B4-BE49-F238E27FC236}">
-                  <a16:creationId xmlns:a16="http://schemas.microsoft.com/office/drawing/2014/main" id="{5E80B45F-8F99-98FB-C191-3A7E58F56D08}"/>
-                </a:ext>
-              </a:extLst>
-            </p:cNvPr>
-            <p:cNvSpPr/>
-            <p:nvPr/>
-          </p:nvSpPr>
-          <p:spPr>
-            <a:xfrm>
-              <a:off x="175470" y="3932920"/>
-              <a:ext cx="1451994" cy="362279"/>
-            </a:xfrm>
-            <a:prstGeom prst="ellipse">
-              <a:avLst/>
-            </a:prstGeom>
-          </p:spPr>
-          <p:style>
-            <a:lnRef idx="2">
-              <a:schemeClr val="accent1">
-                <a:shade val="50000"/>
-              </a:schemeClr>
-            </a:lnRef>
-            <a:fillRef idx="1">
-              <a:schemeClr val="accent1"/>
-            </a:fillRef>
-            <a:effectRef idx="0">
-              <a:schemeClr val="accent1"/>
-            </a:effectRef>
-            <a:fontRef idx="minor">
-              <a:schemeClr val="lt1"/>
-            </a:fontRef>
-          </p:style>
-          <p:txBody>
-            <a:bodyPr rtlCol="0" anchor="ctr"/>
-            <a:lstStyle/>
-            <a:p>
-              <a:pPr algn="ctr"/>
-              <a:r>
-                <a:rPr lang="fr-FR" dirty="0"/>
-                <a:t>NFC</a:t>
-              </a:r>
-            </a:p>
-          </p:txBody>
-        </p:sp>
-        <p:sp>
-          <p:nvSpPr>
-            <p:cNvPr id="13" name="Rectangle : coins arrondis 12">
-              <a:extLst>
-                <a:ext uri="{FF2B5EF4-FFF2-40B4-BE49-F238E27FC236}">
-                  <a16:creationId xmlns:a16="http://schemas.microsoft.com/office/drawing/2014/main" id="{0F77763D-B987-CF34-26B7-2FB0A4BF2784}"/>
-                </a:ext>
-              </a:extLst>
-            </p:cNvPr>
-            <p:cNvSpPr/>
-            <p:nvPr/>
-          </p:nvSpPr>
-          <p:spPr>
-            <a:xfrm>
-              <a:off x="2185332" y="3022134"/>
-              <a:ext cx="1384184" cy="813732"/>
-            </a:xfrm>
-            <a:prstGeom prst="roundRect">
-              <a:avLst/>
-            </a:prstGeom>
-            <a:noFill/>
-          </p:spPr>
-          <p:style>
-            <a:lnRef idx="2">
-              <a:schemeClr val="accent1">
-                <a:shade val="50000"/>
-              </a:schemeClr>
-            </a:lnRef>
-            <a:fillRef idx="1">
-              <a:schemeClr val="accent1"/>
-            </a:fillRef>
-            <a:effectRef idx="0">
-              <a:schemeClr val="accent1"/>
-            </a:effectRef>
-            <a:fontRef idx="minor">
-              <a:schemeClr val="lt1"/>
-            </a:fontRef>
-          </p:style>
-          <p:txBody>
-            <a:bodyPr rtlCol="0" anchor="ctr"/>
-            <a:lstStyle/>
-            <a:p>
-              <a:pPr algn="ctr"/>
-              <a:r>
-                <a:rPr lang="fr-FR" dirty="0">
-                  <a:solidFill>
-                    <a:schemeClr val="tx1"/>
-                  </a:solidFill>
-                </a:rPr>
-                <a:t>Localisation</a:t>
-              </a:r>
-            </a:p>
-          </p:txBody>
-        </p:sp>
-        <p:cxnSp>
-          <p:nvCxnSpPr>
-            <p:cNvPr id="17" name="Connecteur : en angle 16">
-              <a:extLst>
-                <a:ext uri="{FF2B5EF4-FFF2-40B4-BE49-F238E27FC236}">
-                  <a16:creationId xmlns:a16="http://schemas.microsoft.com/office/drawing/2014/main" id="{0314C3F8-12F9-3110-1619-7067ECA21E23}"/>
-                </a:ext>
-              </a:extLst>
-            </p:cNvPr>
-            <p:cNvCxnSpPr>
-              <a:cxnSpLocks/>
-              <a:stCxn id="9" idx="6"/>
-            </p:cNvCxnSpPr>
-            <p:nvPr/>
-          </p:nvCxnSpPr>
-          <p:spPr>
-            <a:xfrm>
-              <a:off x="1635853" y="3131988"/>
-              <a:ext cx="541090" cy="154225"/>
-            </a:xfrm>
-            <a:prstGeom prst="bentConnector3">
-              <a:avLst>
-                <a:gd name="adj1" fmla="val 29845"/>
-              </a:avLst>
-            </a:prstGeom>
-            <a:ln>
-              <a:tailEnd type="triangle"/>
-            </a:ln>
-          </p:spPr>
-          <p:style>
-            <a:lnRef idx="1">
-              <a:schemeClr val="accent1"/>
-            </a:lnRef>
-            <a:fillRef idx="0">
-              <a:schemeClr val="accent1"/>
-            </a:fillRef>
-            <a:effectRef idx="0">
-              <a:schemeClr val="accent1"/>
-            </a:effectRef>
-            <a:fontRef idx="minor">
-              <a:schemeClr val="tx1"/>
-            </a:fontRef>
-          </p:style>
-        </p:cxnSp>
-        <p:cxnSp>
-          <p:nvCxnSpPr>
-            <p:cNvPr id="20" name="Connecteur : en angle 19">
-              <a:extLst>
-                <a:ext uri="{FF2B5EF4-FFF2-40B4-BE49-F238E27FC236}">
-                  <a16:creationId xmlns:a16="http://schemas.microsoft.com/office/drawing/2014/main" id="{F2CF4EE4-69EC-C7D6-978B-F9A5EF34C9BA}"/>
-                </a:ext>
-              </a:extLst>
-            </p:cNvPr>
-            <p:cNvCxnSpPr>
-              <a:cxnSpLocks/>
-              <a:stCxn id="10" idx="6"/>
-            </p:cNvCxnSpPr>
-            <p:nvPr/>
-          </p:nvCxnSpPr>
-          <p:spPr>
-            <a:xfrm flipV="1">
-              <a:off x="1627464" y="3571787"/>
-              <a:ext cx="549479" cy="118825"/>
-            </a:xfrm>
-            <a:prstGeom prst="bentConnector3">
-              <a:avLst>
-                <a:gd name="adj1" fmla="val 30153"/>
-              </a:avLst>
-            </a:prstGeom>
-            <a:ln>
-              <a:tailEnd type="triangle"/>
-            </a:ln>
-          </p:spPr>
-          <p:style>
-            <a:lnRef idx="1">
-              <a:schemeClr val="accent1"/>
-            </a:lnRef>
-            <a:fillRef idx="0">
-              <a:schemeClr val="accent1"/>
-            </a:fillRef>
-            <a:effectRef idx="0">
-              <a:schemeClr val="accent1"/>
-            </a:effectRef>
-            <a:fontRef idx="minor">
-              <a:schemeClr val="tx1"/>
-            </a:fontRef>
-          </p:style>
-        </p:cxnSp>
-        <p:cxnSp>
-          <p:nvCxnSpPr>
-            <p:cNvPr id="22" name="Connecteur : en angle 21">
-              <a:extLst>
-                <a:ext uri="{FF2B5EF4-FFF2-40B4-BE49-F238E27FC236}">
-                  <a16:creationId xmlns:a16="http://schemas.microsoft.com/office/drawing/2014/main" id="{920D6936-2B92-405A-4E7E-F07E0A36F2EF}"/>
-                </a:ext>
-              </a:extLst>
-            </p:cNvPr>
-            <p:cNvCxnSpPr>
-              <a:cxnSpLocks/>
-              <a:stCxn id="11" idx="6"/>
-            </p:cNvCxnSpPr>
-            <p:nvPr/>
-          </p:nvCxnSpPr>
-          <p:spPr>
-            <a:xfrm flipV="1">
-              <a:off x="1627464" y="3710361"/>
-              <a:ext cx="549479" cy="403699"/>
-            </a:xfrm>
-            <a:prstGeom prst="bentConnector3">
-              <a:avLst/>
-            </a:prstGeom>
-            <a:ln>
-              <a:tailEnd type="triangle"/>
-            </a:ln>
-          </p:spPr>
-          <p:style>
-            <a:lnRef idx="1">
-              <a:schemeClr val="accent1"/>
-            </a:lnRef>
-            <a:fillRef idx="0">
-              <a:schemeClr val="accent1"/>
-            </a:fillRef>
-            <a:effectRef idx="0">
-              <a:schemeClr val="accent1"/>
-            </a:effectRef>
-            <a:fontRef idx="minor">
-              <a:schemeClr val="tx1"/>
-            </a:fontRef>
-          </p:style>
-        </p:cxnSp>
-      </p:grpSp>
-      <p:sp>
-        <p:nvSpPr>
-          <p:cNvPr id="34" name="Ellipse 33">
-            <a:extLst>
-              <a:ext uri="{FF2B5EF4-FFF2-40B4-BE49-F238E27FC236}">
-                <a16:creationId xmlns:a16="http://schemas.microsoft.com/office/drawing/2014/main" id="{63F95585-822D-5F84-4FB7-347D15902B1D}"/>
-              </a:ext>
-            </a:extLst>
-          </p:cNvPr>
-          <p:cNvSpPr/>
-          <p:nvPr/>
-        </p:nvSpPr>
-        <p:spPr>
-          <a:xfrm>
-            <a:off x="183858" y="4061593"/>
-            <a:ext cx="1451994" cy="362279"/>
-          </a:xfrm>
-          <a:prstGeom prst="ellipse">
-            <a:avLst/>
-          </a:prstGeom>
-        </p:spPr>
-        <p:style>
-          <a:lnRef idx="2">
-            <a:schemeClr val="accent1">
-              <a:shade val="50000"/>
-            </a:schemeClr>
-          </a:lnRef>
-          <a:fillRef idx="1">
-            <a:schemeClr val="accent1"/>
-          </a:fillRef>
-          <a:effectRef idx="0">
-            <a:schemeClr val="accent1"/>
-          </a:effectRef>
-          <a:fontRef idx="minor">
-            <a:schemeClr val="lt1"/>
-          </a:fontRef>
-        </p:style>
-        <p:txBody>
-          <a:bodyPr rtlCol="0" anchor="ctr"/>
-          <a:lstStyle/>
-          <a:p>
-            <a:pPr algn="ctr"/>
-            <a:r>
-              <a:rPr lang="fr-FR" dirty="0"/>
-              <a:t>Balises</a:t>
-            </a:r>
-          </a:p>
-        </p:txBody>
-      </p:sp>
-      <p:sp>
-        <p:nvSpPr>
-          <p:cNvPr id="35" name="Ellipse 34">
-            <a:extLst>
-              <a:ext uri="{FF2B5EF4-FFF2-40B4-BE49-F238E27FC236}">
-                <a16:creationId xmlns:a16="http://schemas.microsoft.com/office/drawing/2014/main" id="{332CE12A-F7E9-196C-03CC-CCDAC39D2501}"/>
-              </a:ext>
-            </a:extLst>
-          </p:cNvPr>
-          <p:cNvSpPr/>
-          <p:nvPr/>
-        </p:nvSpPr>
-        <p:spPr>
-          <a:xfrm>
-            <a:off x="4403872" y="5981391"/>
-            <a:ext cx="1451994" cy="362279"/>
-          </a:xfrm>
-          <a:prstGeom prst="ellipse">
-            <a:avLst/>
-          </a:prstGeom>
-        </p:spPr>
-        <p:style>
-          <a:lnRef idx="2">
-            <a:schemeClr val="accent1">
-              <a:shade val="50000"/>
-            </a:schemeClr>
-          </a:lnRef>
-          <a:fillRef idx="1">
-            <a:schemeClr val="accent1"/>
-          </a:fillRef>
-          <a:effectRef idx="0">
-            <a:schemeClr val="accent1"/>
-          </a:effectRef>
-          <a:fontRef idx="minor">
-            <a:schemeClr val="lt1"/>
-          </a:fontRef>
-        </p:style>
-        <p:txBody>
-          <a:bodyPr rtlCol="0" anchor="ctr"/>
-          <a:lstStyle/>
-          <a:p>
-            <a:pPr algn="ctr"/>
-            <a:r>
-              <a:rPr lang="fr-FR" dirty="0"/>
-              <a:t>IHM</a:t>
-            </a:r>
-          </a:p>
-        </p:txBody>
-      </p:sp>
-      <p:sp>
-        <p:nvSpPr>
-          <p:cNvPr id="36" name="Rectangle : coins arrondis 35">
-            <a:extLst>
-              <a:ext uri="{FF2B5EF4-FFF2-40B4-BE49-F238E27FC236}">
-                <a16:creationId xmlns:a16="http://schemas.microsoft.com/office/drawing/2014/main" id="{EE35229E-419E-FB7A-8350-AE38DC9644B2}"/>
-              </a:ext>
-            </a:extLst>
-          </p:cNvPr>
-          <p:cNvSpPr/>
-          <p:nvPr/>
-        </p:nvSpPr>
-        <p:spPr>
-          <a:xfrm>
-            <a:off x="4437428" y="4753917"/>
-            <a:ext cx="1384184" cy="813732"/>
-          </a:xfrm>
-          <a:prstGeom prst="roundRect">
-            <a:avLst/>
-          </a:prstGeom>
-          <a:noFill/>
-        </p:spPr>
-        <p:style>
-          <a:lnRef idx="2">
-            <a:schemeClr val="accent1">
-              <a:shade val="50000"/>
-            </a:schemeClr>
-          </a:lnRef>
-          <a:fillRef idx="1">
-            <a:schemeClr val="accent1"/>
-          </a:fillRef>
-          <a:effectRef idx="0">
-            <a:schemeClr val="accent1"/>
-          </a:effectRef>
-          <a:fontRef idx="minor">
-            <a:schemeClr val="lt1"/>
-          </a:fontRef>
-        </p:style>
-        <p:txBody>
-          <a:bodyPr rtlCol="0" anchor="ctr"/>
-          <a:lstStyle/>
-          <a:p>
-            <a:pPr algn="ctr"/>
-            <a:r>
-              <a:rPr lang="fr-FR" dirty="0">
-                <a:solidFill>
-                  <a:schemeClr val="tx1"/>
-                </a:solidFill>
-              </a:rPr>
-              <a:t>Gestionnaire IHM</a:t>
-            </a:r>
-          </a:p>
-        </p:txBody>
-      </p:sp>
-      <p:sp>
-        <p:nvSpPr>
-          <p:cNvPr id="37" name="Rectangle : coins arrondis 36">
-            <a:extLst>
-              <a:ext uri="{FF2B5EF4-FFF2-40B4-BE49-F238E27FC236}">
-                <a16:creationId xmlns:a16="http://schemas.microsoft.com/office/drawing/2014/main" id="{7B754B41-568F-C0AF-00AE-A6A2DC47A026}"/>
-              </a:ext>
-            </a:extLst>
-          </p:cNvPr>
-          <p:cNvSpPr/>
-          <p:nvPr/>
-        </p:nvSpPr>
-        <p:spPr>
-          <a:xfrm>
-            <a:off x="2176942" y="3835866"/>
-            <a:ext cx="1384184" cy="813732"/>
-          </a:xfrm>
-          <a:prstGeom prst="roundRect">
-            <a:avLst/>
-          </a:prstGeom>
-          <a:noFill/>
-        </p:spPr>
-        <p:style>
-          <a:lnRef idx="2">
-            <a:schemeClr val="accent1">
-              <a:shade val="50000"/>
-            </a:schemeClr>
-          </a:lnRef>
-          <a:fillRef idx="1">
-            <a:schemeClr val="accent1"/>
-          </a:fillRef>
-          <a:effectRef idx="0">
-            <a:schemeClr val="accent1"/>
-          </a:effectRef>
-          <a:fontRef idx="minor">
-            <a:schemeClr val="lt1"/>
-          </a:fontRef>
-        </p:style>
-        <p:txBody>
-          <a:bodyPr rtlCol="0" anchor="ctr"/>
-          <a:lstStyle/>
-          <a:p>
-            <a:pPr algn="ctr"/>
-            <a:r>
-              <a:rPr lang="fr-FR" dirty="0">
-                <a:solidFill>
-                  <a:schemeClr val="tx1"/>
-                </a:solidFill>
-              </a:rPr>
-              <a:t>Détection balises</a:t>
-            </a:r>
-          </a:p>
-        </p:txBody>
-      </p:sp>
-      <p:sp>
-        <p:nvSpPr>
-          <p:cNvPr id="38" name="Rectangle : coins arrondis 37">
-            <a:extLst>
-              <a:ext uri="{FF2B5EF4-FFF2-40B4-BE49-F238E27FC236}">
-                <a16:creationId xmlns:a16="http://schemas.microsoft.com/office/drawing/2014/main" id="{EFF2B3C2-D712-3443-0847-EDFDE9B31840}"/>
-              </a:ext>
-            </a:extLst>
-          </p:cNvPr>
-          <p:cNvSpPr/>
-          <p:nvPr/>
-        </p:nvSpPr>
-        <p:spPr>
-          <a:xfrm>
-            <a:off x="8082098" y="5013976"/>
-            <a:ext cx="1384184" cy="813732"/>
-          </a:xfrm>
-          <a:prstGeom prst="roundRect">
-            <a:avLst/>
-          </a:prstGeom>
-          <a:noFill/>
-        </p:spPr>
-        <p:style>
-          <a:lnRef idx="2">
-            <a:schemeClr val="accent1">
-              <a:shade val="50000"/>
-            </a:schemeClr>
-          </a:lnRef>
-          <a:fillRef idx="1">
-            <a:schemeClr val="accent1"/>
-          </a:fillRef>
-          <a:effectRef idx="0">
-            <a:schemeClr val="accent1"/>
-          </a:effectRef>
-          <a:fontRef idx="minor">
-            <a:schemeClr val="lt1"/>
-          </a:fontRef>
-        </p:style>
-        <p:txBody>
-          <a:bodyPr rtlCol="0" anchor="ctr"/>
-          <a:lstStyle/>
-          <a:p>
-            <a:pPr algn="ctr"/>
-            <a:r>
-              <a:rPr lang="fr-FR" dirty="0">
-                <a:solidFill>
-                  <a:schemeClr val="tx1"/>
-                </a:solidFill>
-              </a:rPr>
-              <a:t>Gestionnaires d’alertes</a:t>
-            </a:r>
-          </a:p>
-        </p:txBody>
-      </p:sp>
-      <p:sp>
-        <p:nvSpPr>
-          <p:cNvPr id="39" name="Rectangle : coins arrondis 38">
-            <a:extLst>
-              <a:ext uri="{FF2B5EF4-FFF2-40B4-BE49-F238E27FC236}">
-                <a16:creationId xmlns:a16="http://schemas.microsoft.com/office/drawing/2014/main" id="{5E0FE08D-6110-7D34-11B3-D57BEC730617}"/>
-              </a:ext>
-            </a:extLst>
-          </p:cNvPr>
-          <p:cNvSpPr/>
-          <p:nvPr/>
-        </p:nvSpPr>
-        <p:spPr>
-          <a:xfrm>
-            <a:off x="9661323" y="5019724"/>
-            <a:ext cx="1384184" cy="813732"/>
-          </a:xfrm>
-          <a:prstGeom prst="roundRect">
-            <a:avLst/>
-          </a:prstGeom>
-          <a:noFill/>
-        </p:spPr>
-        <p:style>
-          <a:lnRef idx="2">
-            <a:schemeClr val="accent1">
-              <a:shade val="50000"/>
-            </a:schemeClr>
-          </a:lnRef>
-          <a:fillRef idx="1">
-            <a:schemeClr val="accent1"/>
-          </a:fillRef>
-          <a:effectRef idx="0">
-            <a:schemeClr val="accent1"/>
-          </a:effectRef>
-          <a:fontRef idx="minor">
-            <a:schemeClr val="lt1"/>
-          </a:fontRef>
-        </p:style>
-        <p:txBody>
-          <a:bodyPr rtlCol="0" anchor="ctr"/>
-          <a:lstStyle/>
-          <a:p>
-            <a:pPr algn="ctr"/>
-            <a:r>
-              <a:rPr lang="fr-FR" dirty="0">
-                <a:solidFill>
-                  <a:schemeClr val="tx1"/>
-                </a:solidFill>
-              </a:rPr>
-              <a:t>Navigation</a:t>
-            </a:r>
-          </a:p>
-        </p:txBody>
-      </p:sp>
-      <p:sp>
-        <p:nvSpPr>
-          <p:cNvPr id="40" name="Rectangle : coins arrondis 39">
-            <a:extLst>
-              <a:ext uri="{FF2B5EF4-FFF2-40B4-BE49-F238E27FC236}">
-                <a16:creationId xmlns:a16="http://schemas.microsoft.com/office/drawing/2014/main" id="{4CC7CF85-73D9-5C3D-5C13-72C728D6DD7A}"/>
-              </a:ext>
-            </a:extLst>
-          </p:cNvPr>
-          <p:cNvSpPr/>
-          <p:nvPr/>
-        </p:nvSpPr>
-        <p:spPr>
-          <a:xfrm>
-            <a:off x="9660625" y="2986209"/>
-            <a:ext cx="1384184" cy="813732"/>
-          </a:xfrm>
-          <a:prstGeom prst="roundRect">
-            <a:avLst/>
-          </a:prstGeom>
-          <a:noFill/>
-        </p:spPr>
-        <p:style>
-          <a:lnRef idx="2">
-            <a:schemeClr val="accent1">
-              <a:shade val="50000"/>
-            </a:schemeClr>
-          </a:lnRef>
-          <a:fillRef idx="1">
-            <a:schemeClr val="accent1"/>
-          </a:fillRef>
-          <a:effectRef idx="0">
-            <a:schemeClr val="accent1"/>
-          </a:effectRef>
-          <a:fontRef idx="minor">
-            <a:schemeClr val="lt1"/>
-          </a:fontRef>
-        </p:style>
-        <p:txBody>
-          <a:bodyPr rtlCol="0" anchor="ctr"/>
-          <a:lstStyle/>
-          <a:p>
-            <a:pPr algn="ctr"/>
-            <a:r>
-              <a:rPr lang="fr-FR" dirty="0">
-                <a:solidFill>
-                  <a:schemeClr val="tx1"/>
-                </a:solidFill>
-              </a:rPr>
-              <a:t>Evitement d’obstacles</a:t>
-            </a:r>
-          </a:p>
-        </p:txBody>
-      </p:sp>
-      <p:sp>
-        <p:nvSpPr>
-          <p:cNvPr id="41" name="Ellipse 40">
-            <a:extLst>
-              <a:ext uri="{FF2B5EF4-FFF2-40B4-BE49-F238E27FC236}">
-                <a16:creationId xmlns:a16="http://schemas.microsoft.com/office/drawing/2014/main" id="{F5E62DA9-4817-1857-CB4C-702544E72A15}"/>
-              </a:ext>
-            </a:extLst>
-          </p:cNvPr>
-          <p:cNvSpPr/>
-          <p:nvPr/>
-        </p:nvSpPr>
-        <p:spPr>
-          <a:xfrm>
-            <a:off x="9635458" y="6087469"/>
-            <a:ext cx="1451994" cy="362279"/>
-          </a:xfrm>
-          <a:prstGeom prst="ellipse">
-            <a:avLst/>
-          </a:prstGeom>
-        </p:spPr>
-        <p:style>
-          <a:lnRef idx="2">
-            <a:schemeClr val="accent1">
-              <a:shade val="50000"/>
-            </a:schemeClr>
-          </a:lnRef>
-          <a:fillRef idx="1">
-            <a:schemeClr val="accent1"/>
-          </a:fillRef>
-          <a:effectRef idx="0">
-            <a:schemeClr val="accent1"/>
-          </a:effectRef>
-          <a:fontRef idx="minor">
-            <a:schemeClr val="lt1"/>
-          </a:fontRef>
-        </p:style>
-        <p:txBody>
-          <a:bodyPr rtlCol="0" anchor="ctr"/>
-          <a:lstStyle/>
-          <a:p>
-            <a:pPr algn="ctr"/>
-            <a:r>
-              <a:rPr lang="fr-FR" dirty="0"/>
-              <a:t>Dijkstra</a:t>
-            </a:r>
-          </a:p>
-        </p:txBody>
-      </p:sp>
-      <p:cxnSp>
-        <p:nvCxnSpPr>
-          <p:cNvPr id="43" name="Connecteur : en angle 42">
-            <a:extLst>
-              <a:ext uri="{FF2B5EF4-FFF2-40B4-BE49-F238E27FC236}">
-                <a16:creationId xmlns:a16="http://schemas.microsoft.com/office/drawing/2014/main" id="{649832DF-EC81-BF95-2CAE-F7BD7955A8A5}"/>
-              </a:ext>
-            </a:extLst>
-          </p:cNvPr>
-          <p:cNvCxnSpPr>
-            <a:cxnSpLocks/>
-            <a:stCxn id="13" idx="3"/>
-          </p:cNvCxnSpPr>
-          <p:nvPr/>
-        </p:nvCxnSpPr>
-        <p:spPr>
-          <a:xfrm>
-            <a:off x="3569515" y="2881780"/>
-            <a:ext cx="867913" cy="414048"/>
-          </a:xfrm>
-          <a:prstGeom prst="bentConnector3">
-            <a:avLst/>
-          </a:prstGeom>
-          <a:ln>
-            <a:tailEnd type="triangle"/>
-          </a:ln>
-        </p:spPr>
-        <p:style>
-          <a:lnRef idx="1">
-            <a:schemeClr val="accent1"/>
-          </a:lnRef>
-          <a:fillRef idx="0">
-            <a:schemeClr val="accent1"/>
-          </a:fillRef>
-          <a:effectRef idx="0">
-            <a:schemeClr val="accent1"/>
-          </a:effectRef>
-          <a:fontRef idx="minor">
-            <a:schemeClr val="tx1"/>
-          </a:fontRef>
-        </p:style>
-      </p:cxnSp>
-      <p:cxnSp>
-        <p:nvCxnSpPr>
-          <p:cNvPr id="45" name="Connecteur : en angle 44">
-            <a:extLst>
-              <a:ext uri="{FF2B5EF4-FFF2-40B4-BE49-F238E27FC236}">
-                <a16:creationId xmlns:a16="http://schemas.microsoft.com/office/drawing/2014/main" id="{099266D4-97F5-4E7B-ADE9-790139E8A7D6}"/>
-              </a:ext>
-            </a:extLst>
-          </p:cNvPr>
-          <p:cNvCxnSpPr>
-            <a:cxnSpLocks/>
-            <a:stCxn id="37" idx="3"/>
-          </p:cNvCxnSpPr>
-          <p:nvPr/>
-        </p:nvCxnSpPr>
-        <p:spPr>
-          <a:xfrm flipV="1">
-            <a:off x="3561126" y="3571624"/>
-            <a:ext cx="876302" cy="671108"/>
-          </a:xfrm>
-          <a:prstGeom prst="bentConnector3">
-            <a:avLst/>
-          </a:prstGeom>
-          <a:ln>
-            <a:tailEnd type="triangle"/>
-          </a:ln>
-        </p:spPr>
-        <p:style>
-          <a:lnRef idx="1">
-            <a:schemeClr val="accent1"/>
-          </a:lnRef>
-          <a:fillRef idx="0">
-            <a:schemeClr val="accent1"/>
-          </a:fillRef>
-          <a:effectRef idx="0">
-            <a:schemeClr val="accent1"/>
-          </a:effectRef>
-          <a:fontRef idx="minor">
-            <a:schemeClr val="tx1"/>
-          </a:fontRef>
-        </p:style>
-      </p:cxnSp>
-      <p:cxnSp>
-        <p:nvCxnSpPr>
-          <p:cNvPr id="47" name="Connecteur droit avec flèche 46">
-            <a:extLst>
-              <a:ext uri="{FF2B5EF4-FFF2-40B4-BE49-F238E27FC236}">
-                <a16:creationId xmlns:a16="http://schemas.microsoft.com/office/drawing/2014/main" id="{9D7B20DF-908E-7C86-8190-D45D11FABD13}"/>
-              </a:ext>
-            </a:extLst>
-          </p:cNvPr>
-          <p:cNvCxnSpPr>
-            <a:cxnSpLocks/>
-            <a:stCxn id="34" idx="6"/>
-            <a:endCxn id="37" idx="1"/>
-          </p:cNvCxnSpPr>
-          <p:nvPr/>
-        </p:nvCxnSpPr>
-        <p:spPr>
-          <a:xfrm flipV="1">
-            <a:off x="1635852" y="4242732"/>
-            <a:ext cx="541090" cy="1"/>
-          </a:xfrm>
-          <a:prstGeom prst="straightConnector1">
-            <a:avLst/>
-          </a:prstGeom>
-          <a:ln>
-            <a:tailEnd type="triangle"/>
-          </a:ln>
-        </p:spPr>
-        <p:style>
-          <a:lnRef idx="1">
-            <a:schemeClr val="accent1"/>
-          </a:lnRef>
-          <a:fillRef idx="0">
-            <a:schemeClr val="accent1"/>
-          </a:fillRef>
-          <a:effectRef idx="0">
-            <a:schemeClr val="accent1"/>
-          </a:effectRef>
-          <a:fontRef idx="minor">
-            <a:schemeClr val="tx1"/>
-          </a:fontRef>
-        </p:style>
-      </p:cxnSp>
-      <p:cxnSp>
-        <p:nvCxnSpPr>
-          <p:cNvPr id="56" name="Connecteur droit avec flèche 55">
-            <a:extLst>
-              <a:ext uri="{FF2B5EF4-FFF2-40B4-BE49-F238E27FC236}">
-                <a16:creationId xmlns:a16="http://schemas.microsoft.com/office/drawing/2014/main" id="{FC53D68D-0788-EF8A-CDDE-B3346EF5CE34}"/>
-              </a:ext>
-            </a:extLst>
-          </p:cNvPr>
-          <p:cNvCxnSpPr>
-            <a:stCxn id="4" idx="2"/>
-            <a:endCxn id="36" idx="0"/>
-          </p:cNvCxnSpPr>
-          <p:nvPr/>
-        </p:nvCxnSpPr>
-        <p:spPr>
-          <a:xfrm>
-            <a:off x="5129520" y="3802310"/>
-            <a:ext cx="0" cy="951607"/>
-          </a:xfrm>
-          <a:prstGeom prst="straightConnector1">
-            <a:avLst/>
-          </a:prstGeom>
-          <a:ln>
-            <a:headEnd type="triangle"/>
-            <a:tailEnd type="triangle"/>
-          </a:ln>
-        </p:spPr>
-        <p:style>
-          <a:lnRef idx="1">
-            <a:schemeClr val="accent1"/>
-          </a:lnRef>
-          <a:fillRef idx="0">
-            <a:schemeClr val="accent1"/>
-          </a:fillRef>
-          <a:effectRef idx="0">
-            <a:schemeClr val="accent1"/>
-          </a:effectRef>
-          <a:fontRef idx="minor">
-            <a:schemeClr val="tx1"/>
-          </a:fontRef>
-        </p:style>
-      </p:cxnSp>
-      <p:cxnSp>
-        <p:nvCxnSpPr>
-          <p:cNvPr id="58" name="Connecteur droit avec flèche 57">
-            <a:extLst>
-              <a:ext uri="{FF2B5EF4-FFF2-40B4-BE49-F238E27FC236}">
-                <a16:creationId xmlns:a16="http://schemas.microsoft.com/office/drawing/2014/main" id="{24B976DA-B15A-61A7-1686-7DAB19BF621D}"/>
-              </a:ext>
-            </a:extLst>
-          </p:cNvPr>
-          <p:cNvCxnSpPr>
-            <a:stCxn id="39" idx="2"/>
-            <a:endCxn id="41" idx="0"/>
-          </p:cNvCxnSpPr>
-          <p:nvPr/>
-        </p:nvCxnSpPr>
-        <p:spPr>
-          <a:xfrm>
-            <a:off x="10353415" y="5833456"/>
-            <a:ext cx="8040" cy="254013"/>
-          </a:xfrm>
-          <a:prstGeom prst="straightConnector1">
-            <a:avLst/>
-          </a:prstGeom>
-          <a:ln>
-            <a:headEnd type="triangle"/>
-            <a:tailEnd type="triangle"/>
-          </a:ln>
-        </p:spPr>
-        <p:style>
-          <a:lnRef idx="1">
-            <a:schemeClr val="accent1"/>
-          </a:lnRef>
-          <a:fillRef idx="0">
-            <a:schemeClr val="accent1"/>
-          </a:fillRef>
-          <a:effectRef idx="0">
-            <a:schemeClr val="accent1"/>
-          </a:effectRef>
-          <a:fontRef idx="minor">
-            <a:schemeClr val="tx1"/>
-          </a:fontRef>
-        </p:style>
-      </p:cxnSp>
-      <p:cxnSp>
-        <p:nvCxnSpPr>
-          <p:cNvPr id="64" name="Connecteur : en angle 63">
-            <a:extLst>
-              <a:ext uri="{FF2B5EF4-FFF2-40B4-BE49-F238E27FC236}">
-                <a16:creationId xmlns:a16="http://schemas.microsoft.com/office/drawing/2014/main" id="{A6F0342A-D2FE-E4F9-C7BD-DB7EF262D74A}"/>
-              </a:ext>
-            </a:extLst>
-          </p:cNvPr>
-          <p:cNvCxnSpPr>
-            <a:cxnSpLocks/>
-            <a:endCxn id="6" idx="1"/>
-          </p:cNvCxnSpPr>
-          <p:nvPr/>
-        </p:nvCxnSpPr>
-        <p:spPr>
-          <a:xfrm flipV="1">
-            <a:off x="5821612" y="2454103"/>
-            <a:ext cx="876302" cy="793498"/>
-          </a:xfrm>
-          <a:prstGeom prst="bentConnector3">
-            <a:avLst>
-              <a:gd name="adj1" fmla="val 50000"/>
-            </a:avLst>
-          </a:prstGeom>
-          <a:ln>
-            <a:tailEnd type="triangle"/>
-          </a:ln>
-        </p:spPr>
-        <p:style>
-          <a:lnRef idx="1">
-            <a:schemeClr val="accent1"/>
-          </a:lnRef>
-          <a:fillRef idx="0">
-            <a:schemeClr val="accent1"/>
-          </a:fillRef>
-          <a:effectRef idx="0">
-            <a:schemeClr val="accent1"/>
-          </a:effectRef>
-          <a:fontRef idx="minor">
-            <a:schemeClr val="tx1"/>
-          </a:fontRef>
-        </p:style>
-      </p:cxnSp>
-      <p:cxnSp>
-        <p:nvCxnSpPr>
-          <p:cNvPr id="73" name="Connecteur : en angle 72">
-            <a:extLst>
-              <a:ext uri="{FF2B5EF4-FFF2-40B4-BE49-F238E27FC236}">
-                <a16:creationId xmlns:a16="http://schemas.microsoft.com/office/drawing/2014/main" id="{5F4AF7E8-F5BC-3D9D-7373-AF8E4715ADCD}"/>
-              </a:ext>
-            </a:extLst>
-          </p:cNvPr>
-          <p:cNvCxnSpPr>
-            <a:endCxn id="5" idx="1"/>
-          </p:cNvCxnSpPr>
-          <p:nvPr/>
-        </p:nvCxnSpPr>
-        <p:spPr>
-          <a:xfrm>
-            <a:off x="5821612" y="3571624"/>
-            <a:ext cx="876302" cy="775427"/>
-          </a:xfrm>
-          <a:prstGeom prst="bentConnector3">
-            <a:avLst/>
-          </a:prstGeom>
-          <a:ln>
-            <a:tailEnd type="triangle"/>
-          </a:ln>
-        </p:spPr>
-        <p:style>
-          <a:lnRef idx="1">
-            <a:schemeClr val="accent1"/>
-          </a:lnRef>
-          <a:fillRef idx="0">
-            <a:schemeClr val="accent1"/>
-          </a:fillRef>
-          <a:effectRef idx="0">
-            <a:schemeClr val="accent1"/>
-          </a:effectRef>
-          <a:fontRef idx="minor">
-            <a:schemeClr val="tx1"/>
-          </a:fontRef>
-        </p:style>
-      </p:cxnSp>
-      <p:cxnSp>
-        <p:nvCxnSpPr>
-          <p:cNvPr id="75" name="Connecteur : en angle 74">
-            <a:extLst>
-              <a:ext uri="{FF2B5EF4-FFF2-40B4-BE49-F238E27FC236}">
-                <a16:creationId xmlns:a16="http://schemas.microsoft.com/office/drawing/2014/main" id="{841990B5-CDAF-C60C-A02C-D28C8D27D427}"/>
-              </a:ext>
-            </a:extLst>
-          </p:cNvPr>
-          <p:cNvCxnSpPr>
-            <a:stCxn id="5" idx="2"/>
-            <a:endCxn id="38" idx="1"/>
-          </p:cNvCxnSpPr>
-          <p:nvPr/>
-        </p:nvCxnSpPr>
-        <p:spPr>
-          <a:xfrm rot="16200000" flipH="1">
-            <a:off x="7402590" y="4741333"/>
-            <a:ext cx="666925" cy="692092"/>
-          </a:xfrm>
-          <a:prstGeom prst="bentConnector2">
-            <a:avLst/>
-          </a:prstGeom>
-          <a:ln>
-            <a:tailEnd type="triangle"/>
-          </a:ln>
-        </p:spPr>
-        <p:style>
-          <a:lnRef idx="1">
-            <a:schemeClr val="accent1"/>
-          </a:lnRef>
-          <a:fillRef idx="0">
-            <a:schemeClr val="accent1"/>
-          </a:fillRef>
-          <a:effectRef idx="0">
-            <a:schemeClr val="accent1"/>
-          </a:effectRef>
-          <a:fontRef idx="minor">
-            <a:schemeClr val="tx1"/>
-          </a:fontRef>
-        </p:style>
-      </p:cxnSp>
-      <p:cxnSp>
-        <p:nvCxnSpPr>
-          <p:cNvPr id="77" name="Connecteur droit avec flèche 76">
-            <a:extLst>
-              <a:ext uri="{FF2B5EF4-FFF2-40B4-BE49-F238E27FC236}">
-                <a16:creationId xmlns:a16="http://schemas.microsoft.com/office/drawing/2014/main" id="{F0256DF0-9A4D-F906-5558-4EA1A4EC6AC4}"/>
-              </a:ext>
-            </a:extLst>
-          </p:cNvPr>
-          <p:cNvCxnSpPr>
-            <a:stCxn id="38" idx="3"/>
-            <a:endCxn id="39" idx="1"/>
-          </p:cNvCxnSpPr>
-          <p:nvPr/>
-        </p:nvCxnSpPr>
-        <p:spPr>
-          <a:xfrm>
-            <a:off x="9466282" y="5420842"/>
-            <a:ext cx="195041" cy="5748"/>
-          </a:xfrm>
-          <a:prstGeom prst="straightConnector1">
-            <a:avLst/>
-          </a:prstGeom>
-          <a:ln>
-            <a:tailEnd type="triangle"/>
-          </a:ln>
-        </p:spPr>
-        <p:style>
-          <a:lnRef idx="1">
-            <a:schemeClr val="accent1"/>
-          </a:lnRef>
-          <a:fillRef idx="0">
-            <a:schemeClr val="accent1"/>
-          </a:fillRef>
-          <a:effectRef idx="0">
-            <a:schemeClr val="accent1"/>
-          </a:effectRef>
-          <a:fontRef idx="minor">
-            <a:schemeClr val="tx1"/>
-          </a:fontRef>
-        </p:style>
-      </p:cxnSp>
-      <p:cxnSp>
-        <p:nvCxnSpPr>
-          <p:cNvPr id="85" name="Connecteur droit avec flèche 84">
-            <a:extLst>
-              <a:ext uri="{FF2B5EF4-FFF2-40B4-BE49-F238E27FC236}">
-                <a16:creationId xmlns:a16="http://schemas.microsoft.com/office/drawing/2014/main" id="{D6393167-CD56-D7FD-A5D4-364CFB24F497}"/>
-              </a:ext>
-            </a:extLst>
-          </p:cNvPr>
-          <p:cNvCxnSpPr>
-            <a:cxnSpLocks/>
-            <a:stCxn id="39" idx="0"/>
-            <a:endCxn id="40" idx="2"/>
-          </p:cNvCxnSpPr>
-          <p:nvPr/>
-        </p:nvCxnSpPr>
-        <p:spPr>
-          <a:xfrm flipH="1" flipV="1">
-            <a:off x="10352717" y="3799941"/>
-            <a:ext cx="698" cy="1219783"/>
-          </a:xfrm>
-          <a:prstGeom prst="straightConnector1">
-            <a:avLst/>
-          </a:prstGeom>
-          <a:ln>
-            <a:tailEnd type="triangle"/>
-          </a:ln>
-        </p:spPr>
-        <p:style>
-          <a:lnRef idx="1">
-            <a:schemeClr val="accent1"/>
-          </a:lnRef>
-          <a:fillRef idx="0">
-            <a:schemeClr val="accent1"/>
-          </a:fillRef>
-          <a:effectRef idx="0">
-            <a:schemeClr val="accent1"/>
-          </a:effectRef>
-          <a:fontRef idx="minor">
-            <a:schemeClr val="tx1"/>
-          </a:fontRef>
-        </p:style>
-      </p:cxnSp>
-      <p:cxnSp>
-        <p:nvCxnSpPr>
-          <p:cNvPr id="91" name="Connecteur : en angle 90">
-            <a:extLst>
-              <a:ext uri="{FF2B5EF4-FFF2-40B4-BE49-F238E27FC236}">
-                <a16:creationId xmlns:a16="http://schemas.microsoft.com/office/drawing/2014/main" id="{0514B31D-2EBD-B825-7FA8-E1B64CEE08AA}"/>
-              </a:ext>
-            </a:extLst>
-          </p:cNvPr>
-          <p:cNvCxnSpPr>
-            <a:stCxn id="6" idx="3"/>
-            <a:endCxn id="40" idx="1"/>
-          </p:cNvCxnSpPr>
-          <p:nvPr/>
-        </p:nvCxnSpPr>
-        <p:spPr>
-          <a:xfrm>
-            <a:off x="8082098" y="2454103"/>
-            <a:ext cx="1578527" cy="938972"/>
-          </a:xfrm>
-          <a:prstGeom prst="bentConnector3">
-            <a:avLst/>
-          </a:prstGeom>
-          <a:ln>
-            <a:tailEnd type="triangle"/>
-          </a:ln>
-        </p:spPr>
-        <p:style>
-          <a:lnRef idx="1">
-            <a:schemeClr val="accent1"/>
-          </a:lnRef>
-          <a:fillRef idx="0">
-            <a:schemeClr val="accent1"/>
-          </a:fillRef>
-          <a:effectRef idx="0">
-            <a:schemeClr val="accent1"/>
-          </a:effectRef>
-          <a:fontRef idx="minor">
-            <a:schemeClr val="tx1"/>
-          </a:fontRef>
-        </p:style>
-      </p:cxnSp>
-      <p:cxnSp>
-        <p:nvCxnSpPr>
-          <p:cNvPr id="94" name="Connecteur droit avec flèche 93">
-            <a:extLst>
-              <a:ext uri="{FF2B5EF4-FFF2-40B4-BE49-F238E27FC236}">
-                <a16:creationId xmlns:a16="http://schemas.microsoft.com/office/drawing/2014/main" id="{6F270C21-B04A-3EC1-5747-5CC35E6E63EF}"/>
-              </a:ext>
-            </a:extLst>
-          </p:cNvPr>
-          <p:cNvCxnSpPr>
-            <a:cxnSpLocks/>
-            <a:stCxn id="36" idx="2"/>
-            <a:endCxn id="35" idx="0"/>
-          </p:cNvCxnSpPr>
-          <p:nvPr/>
-        </p:nvCxnSpPr>
-        <p:spPr>
-          <a:xfrm>
-            <a:off x="5129520" y="5567649"/>
-            <a:ext cx="349" cy="413742"/>
-          </a:xfrm>
-          <a:prstGeom prst="straightConnector1">
-            <a:avLst/>
-          </a:prstGeom>
-          <a:ln>
-            <a:headEnd type="triangle"/>
-            <a:tailEnd type="triangle"/>
-          </a:ln>
-        </p:spPr>
-        <p:style>
-          <a:lnRef idx="1">
-            <a:schemeClr val="accent1"/>
-          </a:lnRef>
-          <a:fillRef idx="0">
-            <a:schemeClr val="accent1"/>
-          </a:fillRef>
-          <a:effectRef idx="0">
-            <a:schemeClr val="accent1"/>
-          </a:effectRef>
-          <a:fontRef idx="minor">
-            <a:schemeClr val="tx1"/>
-          </a:fontRef>
-        </p:style>
-      </p:cxnSp>
-      <p:sp>
-        <p:nvSpPr>
-          <p:cNvPr id="97" name="Ellipse 96">
-            <a:extLst>
-              <a:ext uri="{FF2B5EF4-FFF2-40B4-BE49-F238E27FC236}">
-                <a16:creationId xmlns:a16="http://schemas.microsoft.com/office/drawing/2014/main" id="{347DDB6E-E264-6860-9E9F-3FF861187FEA}"/>
-              </a:ext>
-            </a:extLst>
-          </p:cNvPr>
-          <p:cNvSpPr/>
-          <p:nvPr/>
-        </p:nvSpPr>
-        <p:spPr>
-          <a:xfrm>
-            <a:off x="9691732" y="2333312"/>
-            <a:ext cx="1321969" cy="328568"/>
-          </a:xfrm>
-          <a:prstGeom prst="ellipse">
-            <a:avLst/>
-          </a:prstGeom>
-        </p:spPr>
-        <p:style>
-          <a:lnRef idx="2">
-            <a:schemeClr val="accent1">
-              <a:shade val="50000"/>
-            </a:schemeClr>
-          </a:lnRef>
-          <a:fillRef idx="1">
-            <a:schemeClr val="accent1"/>
-          </a:fillRef>
-          <a:effectRef idx="0">
-            <a:schemeClr val="accent1"/>
-          </a:effectRef>
-          <a:fontRef idx="minor">
-            <a:schemeClr val="lt1"/>
-          </a:fontRef>
-        </p:style>
-        <p:txBody>
-          <a:bodyPr rtlCol="0" anchor="ctr"/>
-          <a:lstStyle/>
-          <a:p>
-            <a:pPr algn="ctr"/>
-            <a:r>
-              <a:rPr lang="fr-FR" dirty="0"/>
-              <a:t>Moteurs</a:t>
-            </a:r>
-          </a:p>
-        </p:txBody>
-      </p:sp>
-      <p:cxnSp>
-        <p:nvCxnSpPr>
-          <p:cNvPr id="99" name="Connecteur droit avec flèche 98">
-            <a:extLst>
-              <a:ext uri="{FF2B5EF4-FFF2-40B4-BE49-F238E27FC236}">
-                <a16:creationId xmlns:a16="http://schemas.microsoft.com/office/drawing/2014/main" id="{B6E6B8BD-6DC5-467F-595F-12C152D9FE05}"/>
-              </a:ext>
-            </a:extLst>
-          </p:cNvPr>
-          <p:cNvCxnSpPr>
-            <a:stCxn id="40" idx="0"/>
-            <a:endCxn id="97" idx="4"/>
-          </p:cNvCxnSpPr>
-          <p:nvPr/>
-        </p:nvCxnSpPr>
-        <p:spPr>
-          <a:xfrm flipV="1">
-            <a:off x="10352717" y="2661880"/>
-            <a:ext cx="0" cy="324329"/>
-          </a:xfrm>
-          <a:prstGeom prst="straightConnector1">
-            <a:avLst/>
-          </a:prstGeom>
-          <a:ln>
-            <a:headEnd type="triangle"/>
-            <a:tailEnd type="triangle"/>
-          </a:ln>
-        </p:spPr>
-        <p:style>
-          <a:lnRef idx="1">
-            <a:schemeClr val="accent1"/>
-          </a:lnRef>
-          <a:fillRef idx="0">
-            <a:schemeClr val="accent1"/>
-          </a:fillRef>
-          <a:effectRef idx="0">
-            <a:schemeClr val="accent1"/>
-          </a:effectRef>
-          <a:fontRef idx="minor">
-            <a:schemeClr val="tx1"/>
-          </a:fontRef>
-        </p:style>
-      </p:cxnSp>
-    </p:spTree>
-    <p:extLst>
-      <p:ext uri="{BB962C8B-B14F-4D97-AF65-F5344CB8AC3E}">
-        <p14:creationId xmlns:p14="http://schemas.microsoft.com/office/powerpoint/2010/main" val="2709414635"/>
       </p:ext>
     </p:extLst>
   </p:cSld>

</xml_diff>